<commit_message>
Minor revisions to my presentation slides.
</commit_message>
<xml_diff>
--- a/docs/presentation_slides/RoboWarsPresentation_AlexCraig.pptx
+++ b/docs/presentation_slides/RoboWarsPresentation_AlexCraig.pptx
@@ -5,10 +5,10 @@
     <p:sldMasterId id="2147483648" r:id="rId1"/>
   </p:sldMasterIdLst>
   <p:notesMasterIdLst>
-    <p:notesMasterId r:id="rId17"/>
+    <p:notesMasterId r:id="rId18"/>
   </p:notesMasterIdLst>
   <p:handoutMasterIdLst>
-    <p:handoutMasterId r:id="rId18"/>
+    <p:handoutMasterId r:id="rId19"/>
   </p:handoutMasterIdLst>
   <p:sldIdLst>
     <p:sldId id="256" r:id="rId2"/>
@@ -22,10 +22,11 @@
     <p:sldId id="268" r:id="rId10"/>
     <p:sldId id="269" r:id="rId11"/>
     <p:sldId id="265" r:id="rId12"/>
-    <p:sldId id="272" r:id="rId13"/>
-    <p:sldId id="273" r:id="rId14"/>
-    <p:sldId id="274" r:id="rId15"/>
-    <p:sldId id="263" r:id="rId16"/>
+    <p:sldId id="275" r:id="rId13"/>
+    <p:sldId id="272" r:id="rId14"/>
+    <p:sldId id="273" r:id="rId15"/>
+    <p:sldId id="274" r:id="rId16"/>
+    <p:sldId id="263" r:id="rId17"/>
   </p:sldIdLst>
   <p:sldSz cx="9144000" cy="6858000" type="screen4x3"/>
   <p:notesSz cx="6858000" cy="9144000"/>
@@ -1057,6 +1058,9 @@
   <p:clrMapOvr>
     <a:masterClrMapping/>
   </p:clrMapOvr>
+  <p:transition>
+    <p:fade/>
+  </p:transition>
 </p:sldLayout>
 </file>
 
@@ -1185,6 +1189,9 @@
   <p:clrMapOvr>
     <a:masterClrMapping/>
   </p:clrMapOvr>
+  <p:transition>
+    <p:fade/>
+  </p:transition>
 </p:sldLayout>
 </file>
 
@@ -1323,6 +1330,9 @@
   <p:clrMapOvr>
     <a:masterClrMapping/>
   </p:clrMapOvr>
+  <p:transition>
+    <p:fade/>
+  </p:transition>
 </p:sldLayout>
 </file>
 
@@ -1451,6 +1461,9 @@
   <p:clrMapOvr>
     <a:masterClrMapping/>
   </p:clrMapOvr>
+  <p:transition>
+    <p:fade/>
+  </p:transition>
 </p:sldLayout>
 </file>
 
@@ -1601,6 +1614,9 @@
   <p:clrMapOvr>
     <a:masterClrMapping/>
   </p:clrMapOvr>
+  <p:transition>
+    <p:fade/>
+  </p:transition>
 </p:sldLayout>
 </file>
 
@@ -1847,6 +1863,9 @@
   <p:clrMapOvr>
     <a:masterClrMapping/>
   </p:clrMapOvr>
+  <p:transition>
+    <p:fade/>
+  </p:transition>
 </p:sldLayout>
 </file>
 
@@ -2232,6 +2251,9 @@
   <p:clrMapOvr>
     <a:masterClrMapping/>
   </p:clrMapOvr>
+  <p:transition>
+    <p:fade/>
+  </p:transition>
 </p:sldLayout>
 </file>
 
@@ -2308,6 +2330,9 @@
   <p:clrMapOvr>
     <a:masterClrMapping/>
   </p:clrMapOvr>
+  <p:transition>
+    <p:fade/>
+  </p:transition>
 </p:sldLayout>
 </file>
 
@@ -2361,6 +2386,9 @@
   <p:clrMapOvr>
     <a:masterClrMapping/>
   </p:clrMapOvr>
+  <p:transition>
+    <p:fade/>
+  </p:transition>
 </p:sldLayout>
 </file>
 
@@ -2596,6 +2624,9 @@
   <p:clrMapOvr>
     <a:masterClrMapping/>
   </p:clrMapOvr>
+  <p:transition>
+    <p:fade/>
+  </p:transition>
 </p:sldLayout>
 </file>
 
@@ -2807,6 +2838,9 @@
   <p:clrMapOvr>
     <a:masterClrMapping/>
   </p:clrMapOvr>
+  <p:transition>
+    <p:fade/>
+  </p:transition>
 </p:sldLayout>
 </file>
 
@@ -3146,6 +3180,9 @@
     <p:sldLayoutId id="2147483658" r:id="rId10"/>
     <p:sldLayoutId id="2147483659" r:id="rId11"/>
   </p:sldLayoutIdLst>
+  <p:transition>
+    <p:fade/>
+  </p:transition>
   <p:hf hdr="0" ftr="0" dt="0"/>
   <p:txStyles>
     <p:titleStyle>
@@ -3625,7 +3662,7 @@
           <a:lstStyle/>
           <a:p>
             <a:r>
-              <a:rPr lang="en-US" dirty="0" smtClean="0"/>
+              <a:rPr lang="en-US" b="1" dirty="0" smtClean="0"/>
               <a:t>Presented: </a:t>
             </a:r>
             <a:r>
@@ -3644,7 +3681,7 @@
           </a:p>
           <a:p>
             <a:r>
-              <a:rPr lang="en-US" dirty="0" smtClean="0"/>
+              <a:rPr lang="en-US" b="1" dirty="0" smtClean="0"/>
               <a:t>Development Team:</a:t>
             </a:r>
           </a:p>
@@ -3686,6 +3723,16 @@
   <p:clrMapOvr>
     <a:masterClrMapping/>
   </p:clrMapOvr>
+  <p:transition>
+    <p:fade/>
+  </p:transition>
+  <p:timing>
+    <p:tnLst>
+      <p:par>
+        <p:cTn id="1" dur="indefinite" restart="never" nodeType="tmRoot"/>
+      </p:par>
+    </p:tnLst>
+  </p:timing>
 </p:sld>
 </file>
 
@@ -3782,6 +3829,16 @@
   <p:clrMapOvr>
     <a:masterClrMapping/>
   </p:clrMapOvr>
+  <p:transition>
+    <p:fade/>
+  </p:transition>
+  <p:timing>
+    <p:tnLst>
+      <p:par>
+        <p:cTn id="1" dur="indefinite" restart="never" nodeType="tmRoot"/>
+      </p:par>
+    </p:tnLst>
+  </p:timing>
 </p:sld>
 </file>
 
@@ -3886,6 +3943,16 @@
   <p:clrMapOvr>
     <a:masterClrMapping/>
   </p:clrMapOvr>
+  <p:transition>
+    <p:fade/>
+  </p:transition>
+  <p:timing>
+    <p:tnLst>
+      <p:par>
+        <p:cTn id="1" dur="indefinite" restart="never" nodeType="tmRoot"/>
+      </p:par>
+    </p:tnLst>
+  </p:timing>
 </p:sld>
 </file>
 
@@ -3947,53 +4014,40 @@
           <a:p>
             <a:r>
               <a:rPr lang="en-US" dirty="0" smtClean="0"/>
-              <a:t>Potential Application</a:t>
+              <a:t>Potential Applications</a:t>
+            </a:r>
+            <a:endParaRPr lang="en-US" dirty="0"/>
+          </a:p>
+        </p:txBody>
+      </p:sp>
+      <p:sp>
+        <p:nvSpPr>
+          <p:cNvPr id="4101" name="Rectangle 5"/>
+          <p:cNvSpPr>
+            <a:spLocks noGrp="1" noChangeArrowheads="1"/>
+          </p:cNvSpPr>
+          <p:nvPr>
+            <p:ph type="body" idx="1"/>
+          </p:nvPr>
+        </p:nvSpPr>
+        <p:spPr/>
+        <p:txBody>
+          <a:bodyPr/>
+          <a:lstStyle/>
+          <a:p>
+            <a:r>
+              <a:rPr lang="en-US" dirty="0" smtClean="0"/>
+              <a:t>In our implementation no information regarding the state of the virtual world is transmitted to the robots, as it is not required for our system.</a:t>
             </a:r>
             <a:br>
               <a:rPr lang="en-US" dirty="0" smtClean="0"/>
             </a:br>
-            <a:r>
-              <a:rPr lang="en-US" b="1" dirty="0" smtClean="0"/>
-              <a:t>Elderly / Disabled Assistance</a:t>
-            </a:r>
-            <a:endParaRPr lang="en-US" b="1" dirty="0"/>
-          </a:p>
-        </p:txBody>
-      </p:sp>
-      <p:sp>
-        <p:nvSpPr>
-          <p:cNvPr id="4101" name="Rectangle 5"/>
-          <p:cNvSpPr>
-            <a:spLocks noGrp="1" noChangeArrowheads="1"/>
-          </p:cNvSpPr>
-          <p:nvPr>
-            <p:ph type="body" idx="1"/>
-          </p:nvPr>
-        </p:nvSpPr>
-        <p:spPr>
-          <a:xfrm>
-            <a:off x="1981200" y="2209800"/>
-            <a:ext cx="6858000" cy="4419600"/>
-          </a:xfrm>
-        </p:spPr>
-        <p:txBody>
-          <a:bodyPr/>
-          <a:lstStyle/>
-          <a:p>
-            <a:r>
-              <a:rPr lang="en-US" dirty="0"/>
-              <a:t>A</a:t>
-            </a:r>
+            <a:endParaRPr lang="en-US" dirty="0" smtClean="0"/>
+          </a:p>
+          <a:p>
             <a:r>
               <a:rPr lang="en-US" dirty="0" smtClean="0"/>
-              <a:t> virtual world could be used to collaborate with other sensors and appliances in a home environment. For example, stored information might include appliance settings, thermostat settings, the status of lights in various rooms, grocery stocks… etc.</a:t>
-            </a:r>
-            <a:endParaRPr lang="en-US" dirty="0"/>
-          </a:p>
-          <a:p>
-            <a:r>
-              <a:rPr lang="en-US" dirty="0" smtClean="0"/>
-              <a:t>A remotely controlled robotic drone could be used by the elderly or disabled to perform simple tasks around the home such as fetching items or interacting with appliances.</a:t>
+              <a:t>More complex applications may call for remote robots to operate autonomously based on virtual world state when a human operator is not in control.</a:t>
             </a:r>
             <a:endParaRPr lang="en-US" dirty="0"/>
           </a:p>
@@ -4004,6 +4058,16 @@
   <p:clrMapOvr>
     <a:masterClrMapping/>
   </p:clrMapOvr>
+  <p:transition>
+    <p:fade/>
+  </p:transition>
+  <p:timing>
+    <p:tnLst>
+      <p:par>
+        <p:cTn id="1" dur="indefinite" restart="never" nodeType="tmRoot"/>
+      </p:par>
+    </p:tnLst>
+  </p:timing>
 </p:sld>
 </file>
 
@@ -4072,7 +4136,7 @@
             </a:br>
             <a:r>
               <a:rPr lang="en-US" b="1" dirty="0" smtClean="0"/>
-              <a:t>Search and Rescue</a:t>
+              <a:t>Elderly / Disabled Assistance</a:t>
             </a:r>
             <a:endParaRPr lang="en-US" b="1" dirty="0"/>
           </a:p>
@@ -4090,7 +4154,7 @@
         </p:nvSpPr>
         <p:spPr>
           <a:xfrm>
-            <a:off x="1981200" y="2057400"/>
+            <a:off x="1981200" y="2209800"/>
             <a:ext cx="6858000" cy="4419600"/>
           </a:xfrm>
         </p:spPr>
@@ -4099,21 +4163,19 @@
           <a:lstStyle/>
           <a:p>
             <a:r>
+              <a:rPr lang="en-US" dirty="0"/>
+              <a:t>A</a:t>
+            </a:r>
+            <a:r>
               <a:rPr lang="en-US" dirty="0" smtClean="0"/>
-              <a:t>Robotic drones are a means of performing search and rescue operations in areas which may be hazardous or inaccessible to human personnel.</a:t>
+              <a:t> virtual world could be used to collaborate with other sensors and appliances in a home environment. For example, stored information might include appliance settings, thermostat settings, the status of lights in various rooms, grocery stocks… etc.</a:t>
             </a:r>
             <a:endParaRPr lang="en-US" dirty="0"/>
           </a:p>
           <a:p>
             <a:r>
               <a:rPr lang="en-US" dirty="0" smtClean="0"/>
-              <a:t>A virtual world could be used to collaborate sensor information (such as heartbeat sensors, thermal imaging, radar/sonar… etc.), as well as to coordinate the movements of the drones themselves.</a:t>
-            </a:r>
-          </a:p>
-          <a:p>
-            <a:r>
-              <a:rPr lang="en-US" dirty="0" smtClean="0"/>
-              <a:t>A small number of personnel could potentially manage a large number of rescue drones.</a:t>
+              <a:t>A remotely controlled robotic drone could be used by the elderly or disabled to perform simple tasks around the home such as fetching items or interacting with appliances.</a:t>
             </a:r>
             <a:endParaRPr lang="en-US" dirty="0"/>
           </a:p>
@@ -4124,6 +4186,16 @@
   <p:clrMapOvr>
     <a:masterClrMapping/>
   </p:clrMapOvr>
+  <p:transition>
+    <p:fade/>
+  </p:transition>
+  <p:timing>
+    <p:tnLst>
+      <p:par>
+        <p:cTn id="1" dur="indefinite" restart="never" nodeType="tmRoot"/>
+      </p:par>
+    </p:tnLst>
+  </p:timing>
 </p:sld>
 </file>
 
@@ -4192,7 +4264,7 @@
             </a:br>
             <a:r>
               <a:rPr lang="en-US" b="1" dirty="0" smtClean="0"/>
-              <a:t>Security and Surveillance</a:t>
+              <a:t>Search and Rescue</a:t>
             </a:r>
             <a:endParaRPr lang="en-US" b="1" dirty="0"/>
           </a:p>
@@ -4220,19 +4292,20 @@
           <a:p>
             <a:r>
               <a:rPr lang="en-US" dirty="0" smtClean="0"/>
-              <a:t>Robotic drones could be used to augment an existing security system by using a virtual world to collaborate with existing alarm and camera systems.</a:t>
-            </a:r>
+              <a:t>Robotic drones are a means of performing search and rescue operations in areas which may be hazardous or inaccessible to human personnel.</a:t>
+            </a:r>
+            <a:endParaRPr lang="en-US" dirty="0"/>
           </a:p>
           <a:p>
             <a:r>
               <a:rPr lang="en-US" dirty="0" smtClean="0"/>
-              <a:t>For example, drones could automatically move toward the site of an alarm until a human operator assumes control.</a:t>
+              <a:t>A virtual world could be used to collaborate sensor information (such as heartbeat sensors, thermal imaging, radar/sonar… etc.), as well as to coordinate the movements of the drones themselves.</a:t>
             </a:r>
           </a:p>
           <a:p>
             <a:r>
               <a:rPr lang="en-US" dirty="0" smtClean="0"/>
-              <a:t>A mobile client ensures that security personnel can operate the drones regardless of their current position when an alarm is triggered.</a:t>
+              <a:t>A small number of personnel could potentially manage a large number of rescue drones.</a:t>
             </a:r>
             <a:endParaRPr lang="en-US" dirty="0"/>
           </a:p>
@@ -4243,6 +4316,16 @@
   <p:clrMapOvr>
     <a:masterClrMapping/>
   </p:clrMapOvr>
+  <p:transition>
+    <p:fade/>
+  </p:transition>
+  <p:timing>
+    <p:tnLst>
+      <p:par>
+        <p:cTn id="1" dur="indefinite" restart="never" nodeType="tmRoot"/>
+      </p:par>
+    </p:tnLst>
+  </p:timing>
 </p:sld>
 </file>
 
@@ -4304,9 +4387,16 @@
           <a:p>
             <a:r>
               <a:rPr lang="en-US" dirty="0" smtClean="0"/>
-              <a:t>References</a:t>
-            </a:r>
-            <a:endParaRPr lang="en-US" dirty="0"/>
+              <a:t>Potential Application</a:t>
+            </a:r>
+            <a:br>
+              <a:rPr lang="en-US" dirty="0" smtClean="0"/>
+            </a:br>
+            <a:r>
+              <a:rPr lang="en-US" b="1" dirty="0" smtClean="0"/>
+              <a:t>Security and Surveillance</a:t>
+            </a:r>
+            <a:endParaRPr lang="en-US" b="1" dirty="0"/>
           </a:p>
         </p:txBody>
       </p:sp>
@@ -4320,86 +4410,41 @@
             <p:ph type="body" idx="1"/>
           </p:nvPr>
         </p:nvSpPr>
-        <p:spPr/>
+        <p:spPr>
+          <a:xfrm>
+            <a:off x="1981200" y="2057400"/>
+            <a:ext cx="6858000" cy="4419600"/>
+          </a:xfrm>
+        </p:spPr>
         <p:txBody>
           <a:bodyPr/>
           <a:lstStyle/>
           <a:p>
             <a:r>
-              <a:rPr lang="en-US" sz="1400" dirty="0" smtClean="0"/>
-              <a:t>[1] </a:t>
-            </a:r>
-            <a:r>
-              <a:rPr lang="en-US" sz="1400" dirty="0" smtClean="0">
-                <a:hlinkClick r:id="rId2"/>
-              </a:rPr>
-              <a:t>http://www.htc.com/www/product/desire/specification.html</a:t>
-            </a:r>
-            <a:endParaRPr lang="en-US" sz="1400" dirty="0" smtClean="0"/>
-          </a:p>
-          <a:p>
-            <a:r>
-              <a:rPr lang="en-US" sz="1400" dirty="0" smtClean="0"/>
-              <a:t>[2] </a:t>
-            </a:r>
-            <a:r>
-              <a:rPr lang="en-US" sz="1400" dirty="0" smtClean="0">
-                <a:hlinkClick r:id="rId3"/>
-              </a:rPr>
-              <a:t>http://mindstorms.lego.com/en-us/products/default.aspx</a:t>
-            </a:r>
-            <a:endParaRPr lang="en-US" sz="1400" dirty="0" smtClean="0"/>
-          </a:p>
-          <a:p>
-            <a:r>
-              <a:rPr lang="en-US" sz="1400" dirty="0" smtClean="0"/>
-              <a:t>[3] </a:t>
-            </a:r>
-            <a:r>
-              <a:rPr lang="en-US" sz="1400" dirty="0" smtClean="0">
-                <a:hlinkClick r:id="rId4"/>
-              </a:rPr>
-              <a:t>http://static.guim.co.uk/sys-images/Technology/Pix/pictures/2009/4/21/1240307015871/Tron-001.jpg</a:t>
-            </a:r>
-            <a:endParaRPr lang="en-US" sz="1400" dirty="0" smtClean="0"/>
-          </a:p>
-          <a:p>
-            <a:r>
-              <a:rPr lang="en-US" sz="1400" dirty="0" smtClean="0"/>
-              <a:t>[4] </a:t>
-            </a:r>
-            <a:r>
-              <a:rPr lang="en-US" sz="1400" dirty="0" smtClean="0">
-                <a:hlinkClick r:id="rId5"/>
-              </a:rPr>
-              <a:t>http://1.bp.blogspot.com/_s0SSX3Y2JTw/S-Cv_6lfKVI/AAAAAAAAFE8/SUlrHiF5RUg/s1600/battlezone_1.gif</a:t>
-            </a:r>
-            <a:endParaRPr lang="en-US" sz="1400" dirty="0" smtClean="0"/>
-          </a:p>
-          <a:p>
-            <a:r>
-              <a:rPr lang="en-US" sz="1400" dirty="0" smtClean="0"/>
-              <a:t>[5] </a:t>
-            </a:r>
-            <a:r>
-              <a:rPr lang="en-US" sz="1400" dirty="0" smtClean="0">
-                <a:hlinkClick r:id="rId6"/>
-              </a:rPr>
-              <a:t>http://www.logitech.com/en-us/webcam-communications/webcams/devices/6333</a:t>
-            </a:r>
-            <a:endParaRPr lang="en-US" sz="1400" dirty="0" smtClean="0"/>
-          </a:p>
-          <a:p>
-            <a:pPr>
-              <a:buNone/>
-            </a:pPr>
-            <a:endParaRPr lang="en-US" sz="1800" dirty="0" smtClean="0"/>
-          </a:p>
-          <a:p>
-            <a:endParaRPr lang="en-US" sz="1800" dirty="0" smtClean="0"/>
-          </a:p>
-          <a:p>
-            <a:endParaRPr lang="en-US" sz="1800" dirty="0"/>
+              <a:rPr lang="en-US" dirty="0" smtClean="0"/>
+              <a:t>Robotic drones could be used to augment an existing security system by using a virtual world to collaborate with existing alarm and camera systems.</a:t>
+            </a:r>
+          </a:p>
+          <a:p>
+            <a:r>
+              <a:rPr lang="en-US" dirty="0" smtClean="0"/>
+              <a:t>For example, drones could automatically move toward the site of an alarm until a human operator assumes control.</a:t>
+            </a:r>
+          </a:p>
+          <a:p>
+            <a:r>
+              <a:rPr lang="en-US" dirty="0" smtClean="0"/>
+              <a:t>A mobile client ensures that security personnel can operate the drones regardless of their current position </a:t>
+            </a:r>
+            <a:r>
+              <a:rPr lang="en-US" dirty="0" smtClean="0"/>
+              <a:t>or activity when </a:t>
+            </a:r>
+            <a:r>
+              <a:rPr lang="en-US" dirty="0" smtClean="0"/>
+              <a:t>an alarm is triggered.</a:t>
+            </a:r>
+            <a:endParaRPr lang="en-US" dirty="0"/>
           </a:p>
         </p:txBody>
       </p:sp>
@@ -4408,6 +4453,191 @@
   <p:clrMapOvr>
     <a:masterClrMapping/>
   </p:clrMapOvr>
+  <p:transition>
+    <p:fade/>
+  </p:transition>
+  <p:timing>
+    <p:tnLst>
+      <p:par>
+        <p:cTn id="1" dur="indefinite" restart="never" nodeType="tmRoot"/>
+      </p:par>
+    </p:tnLst>
+  </p:timing>
+</p:sld>
+</file>
+
+<file path=ppt/slides/slide16.xml><?xml version="1.0" encoding="utf-8"?>
+<p:sld xmlns:a="http://schemas.openxmlformats.org/drawingml/2006/main" xmlns:r="http://schemas.openxmlformats.org/officeDocument/2006/relationships" xmlns:p="http://schemas.openxmlformats.org/presentationml/2006/main">
+  <p:cSld>
+    <p:spTree>
+      <p:nvGrpSpPr>
+        <p:cNvPr id="1" name=""/>
+        <p:cNvGrpSpPr/>
+        <p:nvPr/>
+      </p:nvGrpSpPr>
+      <p:grpSpPr>
+        <a:xfrm>
+          <a:off x="0" y="0"/>
+          <a:ext cx="0" cy="0"/>
+          <a:chOff x="0" y="0"/>
+          <a:chExt cx="0" cy="0"/>
+        </a:xfrm>
+      </p:grpSpPr>
+      <p:sp>
+        <p:nvSpPr>
+          <p:cNvPr id="4" name="Slide Number Placeholder 3"/>
+          <p:cNvSpPr>
+            <a:spLocks noGrp="1"/>
+          </p:cNvSpPr>
+          <p:nvPr>
+            <p:ph type="sldNum" sz="quarter" idx="10"/>
+          </p:nvPr>
+        </p:nvSpPr>
+        <p:spPr/>
+        <p:txBody>
+          <a:bodyPr/>
+          <a:lstStyle/>
+          <a:p>
+            <a:fld id="{284CB430-D7DB-450E-8FF5-AD4ED9D28849}" type="slidenum">
+              <a:rPr lang="en-US"/>
+              <a:pPr/>
+              <a:t>16</a:t>
+            </a:fld>
+            <a:endParaRPr lang="en-US"/>
+          </a:p>
+        </p:txBody>
+      </p:sp>
+      <p:sp>
+        <p:nvSpPr>
+          <p:cNvPr id="4100" name="Rectangle 4"/>
+          <p:cNvSpPr>
+            <a:spLocks noGrp="1" noChangeArrowheads="1"/>
+          </p:cNvSpPr>
+          <p:nvPr>
+            <p:ph type="title"/>
+          </p:nvPr>
+        </p:nvSpPr>
+        <p:spPr/>
+        <p:txBody>
+          <a:bodyPr/>
+          <a:lstStyle/>
+          <a:p>
+            <a:r>
+              <a:rPr lang="en-US" dirty="0" smtClean="0"/>
+              <a:t>References</a:t>
+            </a:r>
+            <a:endParaRPr lang="en-US" dirty="0"/>
+          </a:p>
+        </p:txBody>
+      </p:sp>
+      <p:sp>
+        <p:nvSpPr>
+          <p:cNvPr id="4101" name="Rectangle 5"/>
+          <p:cNvSpPr>
+            <a:spLocks noGrp="1" noChangeArrowheads="1"/>
+          </p:cNvSpPr>
+          <p:nvPr>
+            <p:ph type="body" idx="1"/>
+          </p:nvPr>
+        </p:nvSpPr>
+        <p:spPr/>
+        <p:txBody>
+          <a:bodyPr/>
+          <a:lstStyle/>
+          <a:p>
+            <a:r>
+              <a:rPr lang="en-US" sz="1400" dirty="0" smtClean="0"/>
+              <a:t>[1] </a:t>
+            </a:r>
+            <a:r>
+              <a:rPr lang="en-US" sz="1400" dirty="0" smtClean="0">
+                <a:hlinkClick r:id="rId2"/>
+              </a:rPr>
+              <a:t>http://www.htc.com/www/product/desire/specification.html</a:t>
+            </a:r>
+            <a:endParaRPr lang="en-US" sz="1400" dirty="0" smtClean="0"/>
+          </a:p>
+          <a:p>
+            <a:r>
+              <a:rPr lang="en-US" sz="1400" dirty="0" smtClean="0"/>
+              <a:t>[2] </a:t>
+            </a:r>
+            <a:r>
+              <a:rPr lang="en-US" sz="1400" dirty="0" smtClean="0">
+                <a:hlinkClick r:id="rId3"/>
+              </a:rPr>
+              <a:t>http://mindstorms.lego.com/en-us/products/default.aspx</a:t>
+            </a:r>
+            <a:endParaRPr lang="en-US" sz="1400" dirty="0" smtClean="0"/>
+          </a:p>
+          <a:p>
+            <a:r>
+              <a:rPr lang="en-US" sz="1400" dirty="0" smtClean="0"/>
+              <a:t>[3] </a:t>
+            </a:r>
+            <a:r>
+              <a:rPr lang="en-US" sz="1400" dirty="0" smtClean="0">
+                <a:hlinkClick r:id="rId4"/>
+              </a:rPr>
+              <a:t>http://static.guim.co.uk/sys-images/Technology/Pix/pictures/2009/4/21/1240307015871/Tron-001.jpg</a:t>
+            </a:r>
+            <a:endParaRPr lang="en-US" sz="1400" dirty="0" smtClean="0"/>
+          </a:p>
+          <a:p>
+            <a:r>
+              <a:rPr lang="en-US" sz="1400" dirty="0" smtClean="0"/>
+              <a:t>[4] </a:t>
+            </a:r>
+            <a:r>
+              <a:rPr lang="en-US" sz="1400" dirty="0" smtClean="0">
+                <a:hlinkClick r:id="rId5"/>
+              </a:rPr>
+              <a:t>http://1.bp.blogspot.com/_s0SSX3Y2JTw/S-Cv_6lfKVI/AAAAAAAAFE8/SUlrHiF5RUg/s1600/battlezone_1.gif</a:t>
+            </a:r>
+            <a:endParaRPr lang="en-US" sz="1400" dirty="0" smtClean="0"/>
+          </a:p>
+          <a:p>
+            <a:r>
+              <a:rPr lang="en-US" sz="1400" dirty="0" smtClean="0"/>
+              <a:t>[5] </a:t>
+            </a:r>
+            <a:r>
+              <a:rPr lang="en-US" sz="1400" dirty="0" smtClean="0">
+                <a:hlinkClick r:id="rId6"/>
+              </a:rPr>
+              <a:t>http://www.logitech.com/en-us/webcam-communications/webcams/devices/6333</a:t>
+            </a:r>
+            <a:endParaRPr lang="en-US" sz="1400" dirty="0" smtClean="0"/>
+          </a:p>
+          <a:p>
+            <a:pPr>
+              <a:buNone/>
+            </a:pPr>
+            <a:endParaRPr lang="en-US" sz="1800" dirty="0" smtClean="0"/>
+          </a:p>
+          <a:p>
+            <a:endParaRPr lang="en-US" sz="1800" dirty="0" smtClean="0"/>
+          </a:p>
+          <a:p>
+            <a:endParaRPr lang="en-US" sz="1800" dirty="0"/>
+          </a:p>
+        </p:txBody>
+      </p:sp>
+    </p:spTree>
+  </p:cSld>
+  <p:clrMapOvr>
+    <a:masterClrMapping/>
+  </p:clrMapOvr>
+  <p:transition>
+    <p:fade/>
+  </p:transition>
+  <p:timing>
+    <p:tnLst>
+      <p:par>
+        <p:cTn id="1" dur="indefinite" restart="never" nodeType="tmRoot"/>
+      </p:par>
+    </p:tnLst>
+  </p:timing>
 </p:sld>
 </file>
 
@@ -4524,7 +4754,7 @@
               </a:spcBef>
             </a:pPr>
             <a:r>
-              <a:rPr lang="en-US" sz="3200" dirty="0" err="1" smtClean="0">
+              <a:rPr lang="en-US" sz="3200" b="1" dirty="0" err="1" smtClean="0">
                 <a:solidFill>
                   <a:schemeClr val="bg1"/>
                 </a:solidFill>
@@ -4533,7 +4763,7 @@
               <a:t>RoboWars</a:t>
             </a:r>
             <a:r>
-              <a:rPr lang="en-US" sz="3200" dirty="0" smtClean="0">
+              <a:rPr lang="en-US" sz="3200" b="1" dirty="0" smtClean="0">
                 <a:solidFill>
                   <a:schemeClr val="bg1"/>
                 </a:solidFill>
@@ -4541,7 +4771,7 @@
               </a:rPr>
               <a:t> Overview</a:t>
             </a:r>
-            <a:endParaRPr lang="en-US" sz="3200" dirty="0">
+            <a:endParaRPr lang="en-US" sz="3200" b="1" dirty="0">
               <a:solidFill>
                 <a:schemeClr val="bg1"/>
               </a:solidFill>
@@ -4871,6 +5101,16 @@
   <p:clrMapOvr>
     <a:masterClrMapping/>
   </p:clrMapOvr>
+  <p:transition>
+    <p:fade/>
+  </p:transition>
+  <p:timing>
+    <p:tnLst>
+      <p:par>
+        <p:cTn id="1" dur="indefinite" restart="never" nodeType="tmRoot"/>
+      </p:par>
+    </p:tnLst>
+  </p:timing>
 </p:sld>
 </file>
 
@@ -5039,6 +5279,16 @@
   <p:clrMapOvr>
     <a:masterClrMapping/>
   </p:clrMapOvr>
+  <p:transition>
+    <p:fade/>
+  </p:transition>
+  <p:timing>
+    <p:tnLst>
+      <p:par>
+        <p:cTn id="1" dur="indefinite" restart="never" nodeType="tmRoot"/>
+      </p:par>
+    </p:tnLst>
+  </p:timing>
 </p:sld>
 </file>
 
@@ -5136,7 +5386,29 @@
                 <a:ea typeface="+mn-ea"/>
                 <a:cs typeface="+mn-cs"/>
               </a:rPr>
-              <a:t>To combine these objectives, the project aims to create a system which </a:t>
+              <a:t>To combine these </a:t>
+            </a:r>
+            <a:r>
+              <a:rPr lang="en-CA" dirty="0" smtClean="0">
+                <a:solidFill>
+                  <a:schemeClr val="tx1"/>
+                </a:solidFill>
+                <a:latin typeface="+mn-lt"/>
+                <a:ea typeface="+mn-ea"/>
+                <a:cs typeface="+mn-cs"/>
+              </a:rPr>
+              <a:t>objectives </a:t>
+            </a:r>
+            <a:r>
+              <a:rPr lang="en-CA" dirty="0">
+                <a:solidFill>
+                  <a:schemeClr val="tx1"/>
+                </a:solidFill>
+                <a:latin typeface="+mn-lt"/>
+                <a:ea typeface="+mn-ea"/>
+                <a:cs typeface="+mn-cs"/>
+              </a:rPr>
+              <a:t>the project aims to create a system which </a:t>
             </a:r>
             <a:r>
               <a:rPr lang="en-CA" dirty="0" smtClean="0">
@@ -5158,11 +5430,41 @@
                 <a:ea typeface="+mn-ea"/>
                 <a:cs typeface="+mn-cs"/>
               </a:rPr>
-              <a:t>remotely controlled robots to share and interact with a simple virtual world which will be rendered on to a live video feed and displayed to </a:t>
+              <a:t>remotely controlled robots to share and interact with a simple virtual </a:t>
+            </a:r>
+            <a:r>
+              <a:rPr lang="en-CA" dirty="0" smtClean="0">
+                <a:solidFill>
+                  <a:schemeClr val="tx1"/>
+                </a:solidFill>
+                <a:latin typeface="+mn-lt"/>
+                <a:ea typeface="+mn-ea"/>
+                <a:cs typeface="+mn-cs"/>
+              </a:rPr>
+              <a:t>world, which </a:t>
+            </a:r>
+            <a:r>
+              <a:rPr lang="en-CA" dirty="0">
+                <a:solidFill>
+                  <a:schemeClr val="tx1"/>
+                </a:solidFill>
+                <a:latin typeface="+mn-lt"/>
+                <a:ea typeface="+mn-ea"/>
+                <a:cs typeface="+mn-cs"/>
+              </a:rPr>
+              <a:t>will be rendered on to a live video feed and displayed to </a:t>
             </a:r>
             <a:r>
               <a:rPr lang="en-CA" dirty="0" smtClean="0"/>
-              <a:t>the remote operators</a:t>
+              <a:t>the </a:t>
+            </a:r>
+            <a:r>
+              <a:rPr lang="en-CA" dirty="0" smtClean="0"/>
+              <a:t>mobile remote </a:t>
+            </a:r>
+            <a:r>
+              <a:rPr lang="en-CA" dirty="0" smtClean="0"/>
+              <a:t>operators</a:t>
             </a:r>
             <a:r>
               <a:rPr lang="en-CA" dirty="0" smtClean="0">
@@ -5184,6 +5486,16 @@
   <p:clrMapOvr>
     <a:masterClrMapping/>
   </p:clrMapOvr>
+  <p:transition>
+    <p:fade/>
+  </p:transition>
+  <p:timing>
+    <p:tnLst>
+      <p:par>
+        <p:cTn id="1" dur="indefinite" restart="never" nodeType="tmRoot"/>
+      </p:par>
+    </p:tnLst>
+  </p:timing>
 </p:sld>
 </file>
 
@@ -5644,6 +5956,16 @@
   <p:clrMapOvr>
     <a:masterClrMapping/>
   </p:clrMapOvr>
+  <p:transition>
+    <p:fade/>
+  </p:transition>
+  <p:timing>
+    <p:tnLst>
+      <p:par>
+        <p:cTn id="1" dur="indefinite" restart="never" nodeType="tmRoot"/>
+      </p:par>
+    </p:tnLst>
+  </p:timing>
 </p:sld>
 </file>
 
@@ -5684,7 +6006,7 @@
               <a:pPr/>
               <a:t>6</a:t>
             </a:fld>
-            <a:endParaRPr lang="en-US"/>
+            <a:endParaRPr lang="en-US" dirty="0"/>
           </a:p>
         </p:txBody>
       </p:sp>
@@ -5723,7 +6045,7 @@
         </p:nvSpPr>
         <p:spPr>
           <a:xfrm>
-            <a:off x="1981200" y="1905000"/>
+            <a:off x="1981200" y="1600200"/>
             <a:ext cx="6858000" cy="4419600"/>
           </a:xfrm>
         </p:spPr>
@@ -5735,7 +6057,31 @@
               <a:rPr lang="en-US" dirty="0" smtClean="0">
                 <a:latin typeface="+mj-lt"/>
               </a:rPr>
-              <a:t>Robots are placed into a designated arena, and register wirelessly with the application server.</a:t>
+              <a:t>Robots are placed into a designated </a:t>
+            </a:r>
+            <a:r>
+              <a:rPr lang="en-US" dirty="0" smtClean="0">
+                <a:latin typeface="+mj-lt"/>
+              </a:rPr>
+              <a:t>arena where their position is tracked, </a:t>
+            </a:r>
+            <a:r>
+              <a:rPr lang="en-US" dirty="0" smtClean="0">
+                <a:latin typeface="+mj-lt"/>
+              </a:rPr>
+              <a:t>and </a:t>
+            </a:r>
+            <a:r>
+              <a:rPr lang="en-US" dirty="0" smtClean="0">
+                <a:latin typeface="+mj-lt"/>
+              </a:rPr>
+              <a:t>the robots register </a:t>
+            </a:r>
+            <a:r>
+              <a:rPr lang="en-US" dirty="0" smtClean="0">
+                <a:latin typeface="+mj-lt"/>
+              </a:rPr>
+              <a:t>wirelessly with the application server.</a:t>
             </a:r>
           </a:p>
           <a:p>
@@ -5793,7 +6139,7 @@
         </p:blipFill>
         <p:spPr bwMode="auto">
           <a:xfrm>
-            <a:off x="3276600" y="4191000"/>
+            <a:off x="3276600" y="4309336"/>
             <a:ext cx="1180497" cy="1558064"/>
           </a:xfrm>
           <a:prstGeom prst="rect">
@@ -5825,7 +6171,7 @@
         </p:blipFill>
         <p:spPr bwMode="auto">
           <a:xfrm>
-            <a:off x="5558898" y="4191000"/>
+            <a:off x="5558898" y="4285449"/>
             <a:ext cx="1680102" cy="1505751"/>
           </a:xfrm>
           <a:prstGeom prst="rect">
@@ -5848,7 +6194,7 @@
         </p:nvSpPr>
         <p:spPr bwMode="auto">
           <a:xfrm>
-            <a:off x="4495800" y="4682264"/>
+            <a:off x="4495800" y="4800600"/>
             <a:ext cx="1143000" cy="381000"/>
           </a:xfrm>
           <a:prstGeom prst="leftRightArrow">
@@ -5910,6 +6256,16 @@
   <p:clrMapOvr>
     <a:masterClrMapping/>
   </p:clrMapOvr>
+  <p:transition>
+    <p:fade/>
+  </p:transition>
+  <p:timing>
+    <p:tnLst>
+      <p:par>
+        <p:cTn id="1" dur="indefinite" restart="never" nodeType="tmRoot"/>
+      </p:par>
+    </p:tnLst>
+  </p:timing>
 </p:sld>
 </file>
 
@@ -6132,7 +6488,7 @@
               <a:rPr lang="en-US" sz="2000" kern="0" dirty="0" smtClean="0">
                 <a:latin typeface="+mn-lt"/>
               </a:rPr>
-              <a:t>[3] Light Cycles</a:t>
+              <a:t>Light Cycles [3]</a:t>
             </a:r>
             <a:endParaRPr kumimoji="0" lang="en-US" sz="2000" b="0" i="0" u="none" strike="noStrike" kern="0" cap="none" spc="0" normalizeH="0" baseline="0" noProof="0" dirty="0" smtClean="0">
               <a:ln>
@@ -6205,7 +6561,7 @@
               <a:rPr lang="en-US" sz="2000" kern="0" dirty="0" smtClean="0">
                 <a:latin typeface="+mn-lt"/>
               </a:rPr>
-              <a:t>[4] Tank Simulation</a:t>
+              <a:t>Tank Simulation [4]</a:t>
             </a:r>
             <a:endParaRPr kumimoji="0" lang="en-US" sz="2000" b="0" i="0" u="none" strike="noStrike" kern="0" cap="none" spc="0" normalizeH="0" baseline="0" noProof="0" dirty="0" smtClean="0">
               <a:ln>
@@ -6229,6 +6585,16 @@
   <p:clrMapOvr>
     <a:masterClrMapping/>
   </p:clrMapOvr>
+  <p:transition>
+    <p:fade/>
+  </p:transition>
+  <p:timing>
+    <p:tnLst>
+      <p:par>
+        <p:cTn id="1" dur="indefinite" restart="never" nodeType="tmRoot"/>
+      </p:par>
+    </p:tnLst>
+  </p:timing>
 </p:sld>
 </file>
 
@@ -6408,8 +6774,6 @@
                 <a:srgbClr val="F10040"/>
               </a:buClr>
               <a:buSzTx/>
-              <a:buFont typeface="Wingdings" pitchFamily="2" charset="2"/>
-              <a:buChar char="§"/>
               <a:tabLst/>
               <a:defRPr/>
             </a:pPr>
@@ -6428,7 +6792,7 @@
                 <a:ea typeface="+mn-ea"/>
                 <a:cs typeface="+mn-cs"/>
               </a:rPr>
-              <a:t>[5] Logitech </a:t>
+              <a:t>Logitech </a:t>
             </a:r>
             <a:r>
               <a:rPr kumimoji="0" lang="en-US" sz="2000" b="0" i="0" u="none" strike="noStrike" kern="0" cap="none" spc="0" normalizeH="0" baseline="0" noProof="0" dirty="0" err="1" smtClean="0">
@@ -6462,7 +6826,7 @@
                 <a:ea typeface="+mn-ea"/>
                 <a:cs typeface="+mn-cs"/>
               </a:rPr>
-              <a:t> 9000 Pro</a:t>
+              <a:t> 9000 Pro [5]</a:t>
             </a:r>
             <a:endParaRPr kumimoji="0" lang="en-US" sz="2000" b="0" i="0" u="none" strike="noStrike" kern="0" cap="none" spc="0" normalizeH="0" baseline="0" noProof="0" dirty="0" smtClean="0">
               <a:ln>
@@ -6486,6 +6850,16 @@
   <p:clrMapOvr>
     <a:masterClrMapping/>
   </p:clrMapOvr>
+  <p:transition>
+    <p:fade/>
+  </p:transition>
+  <p:timing>
+    <p:tnLst>
+      <p:par>
+        <p:cTn id="1" dur="indefinite" restart="never" nodeType="tmRoot"/>
+      </p:par>
+    </p:tnLst>
+  </p:timing>
 </p:sld>
 </file>
 
@@ -6594,6 +6968,16 @@
   <p:clrMapOvr>
     <a:masterClrMapping/>
   </p:clrMapOvr>
+  <p:transition>
+    <p:fade/>
+  </p:transition>
+  <p:timing>
+    <p:tnLst>
+      <p:par>
+        <p:cTn id="1" dur="indefinite" restart="never" nodeType="tmRoot"/>
+      </p:par>
+    </p:tnLst>
+  </p:timing>
 </p:sld>
 </file>
 

</xml_diff>

<commit_message>
Further revisions to oral presentation slides based on Schramm's recommendations.
</commit_message>
<xml_diff>
--- a/docs/presentation_slides/RoboWarsPresentation_AlexCraig.pptx
+++ b/docs/presentation_slides/RoboWarsPresentation_AlexCraig.pptx
@@ -5,27 +5,29 @@
     <p:sldMasterId id="2147483648" r:id="rId1"/>
   </p:sldMasterIdLst>
   <p:notesMasterIdLst>
-    <p:notesMasterId r:id="rId17"/>
+    <p:notesMasterId r:id="rId19"/>
   </p:notesMasterIdLst>
   <p:handoutMasterIdLst>
-    <p:handoutMasterId r:id="rId18"/>
+    <p:handoutMasterId r:id="rId20"/>
   </p:handoutMasterIdLst>
   <p:sldIdLst>
     <p:sldId id="256" r:id="rId2"/>
     <p:sldId id="258" r:id="rId3"/>
     <p:sldId id="271" r:id="rId4"/>
     <p:sldId id="264" r:id="rId5"/>
-    <p:sldId id="262" r:id="rId6"/>
-    <p:sldId id="257" r:id="rId7"/>
-    <p:sldId id="266" r:id="rId8"/>
-    <p:sldId id="267" r:id="rId9"/>
-    <p:sldId id="268" r:id="rId10"/>
-    <p:sldId id="269" r:id="rId11"/>
-    <p:sldId id="265" r:id="rId12"/>
-    <p:sldId id="272" r:id="rId13"/>
-    <p:sldId id="273" r:id="rId14"/>
-    <p:sldId id="274" r:id="rId15"/>
-    <p:sldId id="263" r:id="rId16"/>
+    <p:sldId id="269" r:id="rId6"/>
+    <p:sldId id="262" r:id="rId7"/>
+    <p:sldId id="257" r:id="rId8"/>
+    <p:sldId id="266" r:id="rId9"/>
+    <p:sldId id="267" r:id="rId10"/>
+    <p:sldId id="268" r:id="rId11"/>
+    <p:sldId id="275" r:id="rId12"/>
+    <p:sldId id="265" r:id="rId13"/>
+    <p:sldId id="276" r:id="rId14"/>
+    <p:sldId id="272" r:id="rId15"/>
+    <p:sldId id="273" r:id="rId16"/>
+    <p:sldId id="274" r:id="rId17"/>
+    <p:sldId id="263" r:id="rId18"/>
   </p:sldIdLst>
   <p:sldSz cx="9144000" cy="6858000" type="screen4x3"/>
   <p:notesSz cx="6858000" cy="9144000"/>
@@ -1057,6 +1059,9 @@
   <p:clrMapOvr>
     <a:masterClrMapping/>
   </p:clrMapOvr>
+  <p:transition>
+    <p:fade/>
+  </p:transition>
 </p:sldLayout>
 </file>
 
@@ -1185,6 +1190,9 @@
   <p:clrMapOvr>
     <a:masterClrMapping/>
   </p:clrMapOvr>
+  <p:transition>
+    <p:fade/>
+  </p:transition>
 </p:sldLayout>
 </file>
 
@@ -1323,6 +1331,9 @@
   <p:clrMapOvr>
     <a:masterClrMapping/>
   </p:clrMapOvr>
+  <p:transition>
+    <p:fade/>
+  </p:transition>
 </p:sldLayout>
 </file>
 
@@ -1451,6 +1462,9 @@
   <p:clrMapOvr>
     <a:masterClrMapping/>
   </p:clrMapOvr>
+  <p:transition>
+    <p:fade/>
+  </p:transition>
 </p:sldLayout>
 </file>
 
@@ -1601,6 +1615,9 @@
   <p:clrMapOvr>
     <a:masterClrMapping/>
   </p:clrMapOvr>
+  <p:transition>
+    <p:fade/>
+  </p:transition>
 </p:sldLayout>
 </file>
 
@@ -1847,6 +1864,9 @@
   <p:clrMapOvr>
     <a:masterClrMapping/>
   </p:clrMapOvr>
+  <p:transition>
+    <p:fade/>
+  </p:transition>
 </p:sldLayout>
 </file>
 
@@ -2232,6 +2252,9 @@
   <p:clrMapOvr>
     <a:masterClrMapping/>
   </p:clrMapOvr>
+  <p:transition>
+    <p:fade/>
+  </p:transition>
 </p:sldLayout>
 </file>
 
@@ -2308,6 +2331,9 @@
   <p:clrMapOvr>
     <a:masterClrMapping/>
   </p:clrMapOvr>
+  <p:transition>
+    <p:fade/>
+  </p:transition>
 </p:sldLayout>
 </file>
 
@@ -2361,6 +2387,9 @@
   <p:clrMapOvr>
     <a:masterClrMapping/>
   </p:clrMapOvr>
+  <p:transition>
+    <p:fade/>
+  </p:transition>
 </p:sldLayout>
 </file>
 
@@ -2596,6 +2625,9 @@
   <p:clrMapOvr>
     <a:masterClrMapping/>
   </p:clrMapOvr>
+  <p:transition>
+    <p:fade/>
+  </p:transition>
 </p:sldLayout>
 </file>
 
@@ -2807,6 +2839,9 @@
   <p:clrMapOvr>
     <a:masterClrMapping/>
   </p:clrMapOvr>
+  <p:transition>
+    <p:fade/>
+  </p:transition>
 </p:sldLayout>
 </file>
 
@@ -3146,6 +3181,9 @@
     <p:sldLayoutId id="2147483658" r:id="rId10"/>
     <p:sldLayoutId id="2147483659" r:id="rId11"/>
   </p:sldLayoutIdLst>
+  <p:transition>
+    <p:fade/>
+  </p:transition>
   <p:hf hdr="0" ftr="0" dt="0"/>
   <p:txStyles>
     <p:titleStyle>
@@ -3686,6 +3724,9 @@
   <p:clrMapOvr>
     <a:masterClrMapping/>
   </p:clrMapOvr>
+  <p:transition>
+    <p:fade/>
+  </p:transition>
 </p:sld>
 </file>
 
@@ -3747,7 +3788,122 @@
           <a:p>
             <a:r>
               <a:rPr lang="en-US" dirty="0" smtClean="0"/>
-              <a:t>System Architecture</a:t>
+              <a:t>Solution – How it Works</a:t>
+            </a:r>
+            <a:endParaRPr lang="en-US" dirty="0"/>
+          </a:p>
+        </p:txBody>
+      </p:sp>
+      <p:sp>
+        <p:nvSpPr>
+          <p:cNvPr id="4101" name="Rectangle 5"/>
+          <p:cNvSpPr>
+            <a:spLocks noGrp="1" noChangeArrowheads="1"/>
+          </p:cNvSpPr>
+          <p:nvPr>
+            <p:ph type="body" idx="1"/>
+          </p:nvPr>
+        </p:nvSpPr>
+        <p:spPr>
+          <a:xfrm>
+            <a:off x="1981200" y="1676400"/>
+            <a:ext cx="6858000" cy="4419600"/>
+          </a:xfrm>
+        </p:spPr>
+        <p:txBody>
+          <a:bodyPr/>
+          <a:lstStyle/>
+          <a:p>
+            <a:r>
+              <a:rPr lang="en-US" dirty="0" smtClean="0"/>
+              <a:t>The mobile client uses OpenGL to render 3D imagery corresponding to the virtual world state on top of the received live video feed.</a:t>
+            </a:r>
+          </a:p>
+          <a:p>
+            <a:endParaRPr lang="en-US" dirty="0" smtClean="0"/>
+          </a:p>
+          <a:p>
+            <a:r>
+              <a:rPr lang="en-US" dirty="0" smtClean="0"/>
+              <a:t>The end user uses either an on-screen button display or the tilt sensors in their smartphone to send movement commands to their paired robot.</a:t>
+            </a:r>
+          </a:p>
+        </p:txBody>
+      </p:sp>
+    </p:spTree>
+  </p:cSld>
+  <p:clrMapOvr>
+    <a:masterClrMapping/>
+  </p:clrMapOvr>
+  <p:transition>
+    <p:fade/>
+  </p:transition>
+</p:sld>
+</file>
+
+<file path=ppt/slides/slide11.xml><?xml version="1.0" encoding="utf-8"?>
+<p:sld xmlns:a="http://schemas.openxmlformats.org/drawingml/2006/main" xmlns:r="http://schemas.openxmlformats.org/officeDocument/2006/relationships" xmlns:p="http://schemas.openxmlformats.org/presentationml/2006/main">
+  <p:cSld>
+    <p:spTree>
+      <p:nvGrpSpPr>
+        <p:cNvPr id="1" name=""/>
+        <p:cNvGrpSpPr/>
+        <p:nvPr/>
+      </p:nvGrpSpPr>
+      <p:grpSpPr>
+        <a:xfrm>
+          <a:off x="0" y="0"/>
+          <a:ext cx="0" cy="0"/>
+          <a:chOff x="0" y="0"/>
+          <a:chExt cx="0" cy="0"/>
+        </a:xfrm>
+      </p:grpSpPr>
+      <p:sp>
+        <p:nvSpPr>
+          <p:cNvPr id="4" name="Slide Number Placeholder 3"/>
+          <p:cNvSpPr>
+            <a:spLocks noGrp="1"/>
+          </p:cNvSpPr>
+          <p:nvPr>
+            <p:ph type="sldNum" sz="quarter" idx="10"/>
+          </p:nvPr>
+        </p:nvSpPr>
+        <p:spPr/>
+        <p:txBody>
+          <a:bodyPr/>
+          <a:lstStyle/>
+          <a:p>
+            <a:fld id="{284CB430-D7DB-450E-8FF5-AD4ED9D28849}" type="slidenum">
+              <a:rPr lang="en-US"/>
+              <a:pPr/>
+              <a:t>11</a:t>
+            </a:fld>
+            <a:endParaRPr lang="en-US"/>
+          </a:p>
+        </p:txBody>
+      </p:sp>
+      <p:sp>
+        <p:nvSpPr>
+          <p:cNvPr id="4100" name="Rectangle 4"/>
+          <p:cNvSpPr>
+            <a:spLocks noGrp="1" noChangeArrowheads="1"/>
+          </p:cNvSpPr>
+          <p:nvPr>
+            <p:ph type="title"/>
+          </p:nvPr>
+        </p:nvSpPr>
+        <p:spPr/>
+        <p:txBody>
+          <a:bodyPr/>
+          <a:lstStyle/>
+          <a:p>
+            <a:r>
+              <a:rPr lang="en-US" dirty="0" smtClean="0"/>
+              <a:t>Solution - System </a:t>
+            </a:r>
+            <a:r>
+              <a:rPr lang="en-US" dirty="0" smtClean="0"/>
+              <a:t>Architecture</a:t>
             </a:r>
             <a:endParaRPr lang="en-US" dirty="0"/>
           </a:p>
@@ -3782,110 +3938,9 @@
   <p:clrMapOvr>
     <a:masterClrMapping/>
   </p:clrMapOvr>
-</p:sld>
-</file>
-
-<file path=ppt/slides/slide11.xml><?xml version="1.0" encoding="utf-8"?>
-<p:sld xmlns:a="http://schemas.openxmlformats.org/drawingml/2006/main" xmlns:r="http://schemas.openxmlformats.org/officeDocument/2006/relationships" xmlns:p="http://schemas.openxmlformats.org/presentationml/2006/main">
-  <p:cSld>
-    <p:spTree>
-      <p:nvGrpSpPr>
-        <p:cNvPr id="1" name=""/>
-        <p:cNvGrpSpPr/>
-        <p:nvPr/>
-      </p:nvGrpSpPr>
-      <p:grpSpPr>
-        <a:xfrm>
-          <a:off x="0" y="0"/>
-          <a:ext cx="0" cy="0"/>
-          <a:chOff x="0" y="0"/>
-          <a:chExt cx="0" cy="0"/>
-        </a:xfrm>
-      </p:grpSpPr>
-      <p:sp>
-        <p:nvSpPr>
-          <p:cNvPr id="4" name="Slide Number Placeholder 3"/>
-          <p:cNvSpPr>
-            <a:spLocks noGrp="1"/>
-          </p:cNvSpPr>
-          <p:nvPr>
-            <p:ph type="sldNum" sz="quarter" idx="10"/>
-          </p:nvPr>
-        </p:nvSpPr>
-        <p:spPr/>
-        <p:txBody>
-          <a:bodyPr/>
-          <a:lstStyle/>
-          <a:p>
-            <a:fld id="{284CB430-D7DB-450E-8FF5-AD4ED9D28849}" type="slidenum">
-              <a:rPr lang="en-US"/>
-              <a:pPr/>
-              <a:t>11</a:t>
-            </a:fld>
-            <a:endParaRPr lang="en-US"/>
-          </a:p>
-        </p:txBody>
-      </p:sp>
-      <p:sp>
-        <p:nvSpPr>
-          <p:cNvPr id="4100" name="Rectangle 4"/>
-          <p:cNvSpPr>
-            <a:spLocks noGrp="1" noChangeArrowheads="1"/>
-          </p:cNvSpPr>
-          <p:nvPr>
-            <p:ph type="title"/>
-          </p:nvPr>
-        </p:nvSpPr>
-        <p:spPr/>
-        <p:txBody>
-          <a:bodyPr/>
-          <a:lstStyle/>
-          <a:p>
-            <a:r>
-              <a:rPr lang="en-US" dirty="0" smtClean="0"/>
-              <a:t>Potential Applications</a:t>
-            </a:r>
-            <a:endParaRPr lang="en-US" dirty="0"/>
-          </a:p>
-        </p:txBody>
-      </p:sp>
-      <p:sp>
-        <p:nvSpPr>
-          <p:cNvPr id="4101" name="Rectangle 5"/>
-          <p:cNvSpPr>
-            <a:spLocks noGrp="1" noChangeArrowheads="1"/>
-          </p:cNvSpPr>
-          <p:nvPr>
-            <p:ph type="body" idx="1"/>
-          </p:nvPr>
-        </p:nvSpPr>
-        <p:spPr/>
-        <p:txBody>
-          <a:bodyPr/>
-          <a:lstStyle/>
-          <a:p>
-            <a:r>
-              <a:rPr lang="en-US" dirty="0" smtClean="0"/>
-              <a:t>Although video games are used as the virtual worlds in our prototype, this is not a hard limitation.</a:t>
-            </a:r>
-          </a:p>
-          <a:p>
-            <a:endParaRPr lang="en-US" dirty="0"/>
-          </a:p>
-          <a:p>
-            <a:r>
-              <a:rPr lang="en-US" dirty="0" smtClean="0"/>
-              <a:t>Virtual world state could be entirely simulated as in the prototype case, or the virtual world could be used to collaborate sensor information from external sources.</a:t>
-            </a:r>
-            <a:endParaRPr lang="en-US" dirty="0"/>
-          </a:p>
-        </p:txBody>
-      </p:sp>
-    </p:spTree>
-  </p:cSld>
-  <p:clrMapOvr>
-    <a:masterClrMapping/>
-  </p:clrMapOvr>
+  <p:transition>
+    <p:fade/>
+  </p:transition>
 </p:sld>
 </file>
 
@@ -3947,16 +4002,9 @@
           <a:p>
             <a:r>
               <a:rPr lang="en-US" dirty="0" smtClean="0"/>
-              <a:t>Potential Application</a:t>
-            </a:r>
-            <a:br>
-              <a:rPr lang="en-US" dirty="0" smtClean="0"/>
-            </a:br>
-            <a:r>
-              <a:rPr lang="en-US" b="1" dirty="0" smtClean="0"/>
-              <a:t>Elderly / Disabled Assistance</a:t>
-            </a:r>
-            <a:endParaRPr lang="en-US" b="1" dirty="0"/>
+              <a:t>Potential Applications</a:t>
+            </a:r>
+            <a:endParaRPr lang="en-US" dirty="0"/>
           </a:p>
         </p:txBody>
       </p:sp>
@@ -3970,30 +4018,31 @@
             <p:ph type="body" idx="1"/>
           </p:nvPr>
         </p:nvSpPr>
-        <p:spPr>
-          <a:xfrm>
-            <a:off x="1981200" y="2209800"/>
-            <a:ext cx="6858000" cy="4419600"/>
-          </a:xfrm>
-        </p:spPr>
+        <p:spPr/>
         <p:txBody>
           <a:bodyPr/>
           <a:lstStyle/>
           <a:p>
             <a:r>
-              <a:rPr lang="en-US" dirty="0"/>
-              <a:t>A</a:t>
-            </a:r>
-            <a:r>
               <a:rPr lang="en-US" dirty="0" smtClean="0"/>
-              <a:t> virtual world could be used to collaborate with other sensors and appliances in a home environment. For example, stored information might include appliance settings, thermostat settings, the status of lights in various rooms, grocery stocks… etc.</a:t>
-            </a:r>
-            <a:endParaRPr lang="en-US" dirty="0"/>
-          </a:p>
-          <a:p>
+              <a:t>Virtual </a:t>
+            </a:r>
             <a:r>
               <a:rPr lang="en-US" dirty="0" smtClean="0"/>
-              <a:t>A remotely controlled robotic drone could be used by the elderly or disabled to perform simple tasks around the home such as fetching items or interacting with appliances.</a:t>
+              <a:t>world state could be entirely simulated as in the prototype case, or the virtual world could be used to collaborate sensor information from external sources</a:t>
+            </a:r>
+            <a:r>
+              <a:rPr lang="en-US" dirty="0" smtClean="0"/>
+              <a:t>.</a:t>
+            </a:r>
+          </a:p>
+          <a:p>
+            <a:endParaRPr lang="en-US" dirty="0" smtClean="0"/>
+          </a:p>
+          <a:p>
+            <a:r>
+              <a:rPr lang="en-US" dirty="0" smtClean="0"/>
+              <a:t>In our implementation, robots remain idle when not paired and do not receive virtual world state. Robots could operate autonomously while making use of virtual world data when not actively paired to a human operator.</a:t>
             </a:r>
             <a:endParaRPr lang="en-US" dirty="0"/>
           </a:p>
@@ -4004,6 +4053,9 @@
   <p:clrMapOvr>
     <a:masterClrMapping/>
   </p:clrMapOvr>
+  <p:transition>
+    <p:fade/>
+  </p:transition>
 </p:sld>
 </file>
 
@@ -4065,16 +4117,9 @@
           <a:p>
             <a:r>
               <a:rPr lang="en-US" dirty="0" smtClean="0"/>
-              <a:t>Potential Application</a:t>
-            </a:r>
-            <a:br>
-              <a:rPr lang="en-US" dirty="0" smtClean="0"/>
-            </a:br>
-            <a:r>
-              <a:rPr lang="en-US" b="1" dirty="0" smtClean="0"/>
-              <a:t>Search and Rescue</a:t>
-            </a:r>
-            <a:endParaRPr lang="en-US" b="1" dirty="0"/>
+              <a:t>Potential Applications</a:t>
+            </a:r>
+            <a:endParaRPr lang="en-US" dirty="0"/>
           </a:p>
         </p:txBody>
       </p:sp>
@@ -4088,32 +4133,32 @@
             <p:ph type="body" idx="1"/>
           </p:nvPr>
         </p:nvSpPr>
-        <p:spPr>
-          <a:xfrm>
-            <a:off x="1981200" y="2057400"/>
-            <a:ext cx="6858000" cy="4419600"/>
-          </a:xfrm>
-        </p:spPr>
+        <p:spPr/>
         <p:txBody>
           <a:bodyPr/>
           <a:lstStyle/>
           <a:p>
             <a:r>
               <a:rPr lang="en-US" dirty="0" smtClean="0"/>
-              <a:t>Robotic drones are a means of performing search and rescue operations in areas which may be hazardous or inaccessible to human personnel.</a:t>
-            </a:r>
-            <a:endParaRPr lang="en-US" dirty="0"/>
+              <a:t>Elderly / Disabled Assistance</a:t>
+            </a:r>
+          </a:p>
+          <a:p>
+            <a:endParaRPr lang="en-US" dirty="0" smtClean="0"/>
           </a:p>
           <a:p>
             <a:r>
               <a:rPr lang="en-US" dirty="0" smtClean="0"/>
-              <a:t>A virtual world could be used to collaborate sensor information (such as heartbeat sensors, thermal imaging, radar/sonar… etc.), as well as to coordinate the movements of the drones themselves.</a:t>
-            </a:r>
+              <a:t>Search and Rescue</a:t>
+            </a:r>
+          </a:p>
+          <a:p>
+            <a:endParaRPr lang="en-US" dirty="0" smtClean="0"/>
           </a:p>
           <a:p>
             <a:r>
               <a:rPr lang="en-US" dirty="0" smtClean="0"/>
-              <a:t>A small number of personnel could potentially manage a large number of rescue drones.</a:t>
+              <a:t>Security and Surveillance</a:t>
             </a:r>
             <a:endParaRPr lang="en-US" dirty="0"/>
           </a:p>
@@ -4124,6 +4169,9 @@
   <p:clrMapOvr>
     <a:masterClrMapping/>
   </p:clrMapOvr>
+  <p:transition>
+    <p:fade/>
+  </p:transition>
 </p:sld>
 </file>
 
@@ -4192,7 +4240,7 @@
             </a:br>
             <a:r>
               <a:rPr lang="en-US" b="1" dirty="0" smtClean="0"/>
-              <a:t>Security and Surveillance</a:t>
+              <a:t>Elderly / Disabled Assistance</a:t>
             </a:r>
             <a:endParaRPr lang="en-US" b="1" dirty="0"/>
           </a:p>
@@ -4210,7 +4258,7 @@
         </p:nvSpPr>
         <p:spPr>
           <a:xfrm>
-            <a:off x="1981200" y="2057400"/>
+            <a:off x="1981200" y="2209800"/>
             <a:ext cx="6858000" cy="4419600"/>
           </a:xfrm>
         </p:spPr>
@@ -4219,20 +4267,23 @@
           <a:lstStyle/>
           <a:p>
             <a:r>
+              <a:rPr lang="en-US" dirty="0"/>
+              <a:t>A</a:t>
+            </a:r>
+            <a:r>
               <a:rPr lang="en-US" dirty="0" smtClean="0"/>
-              <a:t>Robotic drones could be used to augment an existing security system by using a virtual world to collaborate with existing alarm and camera systems.</a:t>
-            </a:r>
-          </a:p>
-          <a:p>
+              <a:t> virtual world could be used to collaborate with other sensors and appliances in a home environment</a:t>
+            </a:r>
             <a:r>
               <a:rPr lang="en-US" dirty="0" smtClean="0"/>
-              <a:t>For example, drones could automatically move toward the site of an alarm until a human operator assumes control.</a:t>
-            </a:r>
+              <a:t>. For example, stored information might include appliance settings, thermostat settings, the status of lights in various rooms, grocery stocks… etc.</a:t>
+            </a:r>
+            <a:endParaRPr lang="en-US" dirty="0"/>
           </a:p>
           <a:p>
             <a:r>
               <a:rPr lang="en-US" dirty="0" smtClean="0"/>
-              <a:t>A mobile client ensures that security personnel can operate the drones regardless of their current position when an alarm is triggered.</a:t>
+              <a:t>A remotely controlled robotic drone could be used by the elderly or disabled to perform simple tasks around the home such as fetching items or interacting with appliances.</a:t>
             </a:r>
             <a:endParaRPr lang="en-US" dirty="0"/>
           </a:p>
@@ -4243,6 +4294,9 @@
   <p:clrMapOvr>
     <a:masterClrMapping/>
   </p:clrMapOvr>
+  <p:transition>
+    <p:fade/>
+  </p:transition>
 </p:sld>
 </file>
 
@@ -4304,9 +4358,16 @@
           <a:p>
             <a:r>
               <a:rPr lang="en-US" dirty="0" smtClean="0"/>
-              <a:t>References</a:t>
-            </a:r>
-            <a:endParaRPr lang="en-US" dirty="0"/>
+              <a:t>Potential Application</a:t>
+            </a:r>
+            <a:br>
+              <a:rPr lang="en-US" dirty="0" smtClean="0"/>
+            </a:br>
+            <a:r>
+              <a:rPr lang="en-US" b="1" dirty="0" smtClean="0"/>
+              <a:t>Search and Rescue</a:t>
+            </a:r>
+            <a:endParaRPr lang="en-US" b="1" dirty="0"/>
           </a:p>
         </p:txBody>
       </p:sp>
@@ -4320,92 +4381,55 @@
             <p:ph type="body" idx="1"/>
           </p:nvPr>
         </p:nvSpPr>
-        <p:spPr/>
+        <p:spPr>
+          <a:xfrm>
+            <a:off x="1981200" y="2057400"/>
+            <a:ext cx="6858000" cy="4419600"/>
+          </a:xfrm>
+        </p:spPr>
         <p:txBody>
           <a:bodyPr/>
           <a:lstStyle/>
           <a:p>
             <a:r>
-              <a:rPr lang="en-US" sz="1400" dirty="0" smtClean="0"/>
-              <a:t>[1] </a:t>
-            </a:r>
-            <a:r>
-              <a:rPr lang="en-US" sz="1400" dirty="0" smtClean="0">
-                <a:hlinkClick r:id="rId2"/>
-              </a:rPr>
-              <a:t>http://www.htc.com/www/product/desire/specification.html</a:t>
-            </a:r>
-            <a:endParaRPr lang="en-US" sz="1400" dirty="0" smtClean="0"/>
-          </a:p>
-          <a:p>
-            <a:r>
-              <a:rPr lang="en-US" sz="1400" dirty="0" smtClean="0"/>
-              <a:t>[2] </a:t>
-            </a:r>
-            <a:r>
-              <a:rPr lang="en-US" sz="1400" dirty="0" smtClean="0">
-                <a:hlinkClick r:id="rId3"/>
-              </a:rPr>
-              <a:t>http://mindstorms.lego.com/en-us/products/default.aspx</a:t>
-            </a:r>
-            <a:endParaRPr lang="en-US" sz="1400" dirty="0" smtClean="0"/>
-          </a:p>
-          <a:p>
-            <a:r>
-              <a:rPr lang="en-US" sz="1400" dirty="0" smtClean="0"/>
-              <a:t>[3] </a:t>
-            </a:r>
-            <a:r>
-              <a:rPr lang="en-US" sz="1400" dirty="0" smtClean="0">
-                <a:hlinkClick r:id="rId4"/>
-              </a:rPr>
-              <a:t>http://static.guim.co.uk/sys-images/Technology/Pix/pictures/2009/4/21/1240307015871/Tron-001.jpg</a:t>
-            </a:r>
-            <a:endParaRPr lang="en-US" sz="1400" dirty="0" smtClean="0"/>
-          </a:p>
-          <a:p>
-            <a:r>
-              <a:rPr lang="en-US" sz="1400" dirty="0" smtClean="0"/>
-              <a:t>[4] </a:t>
-            </a:r>
-            <a:r>
-              <a:rPr lang="en-US" sz="1400" dirty="0" smtClean="0">
-                <a:hlinkClick r:id="rId5"/>
-              </a:rPr>
-              <a:t>http://1.bp.blogspot.com/_s0SSX3Y2JTw/S-Cv_6lfKVI/AAAAAAAAFE8/SUlrHiF5RUg/s1600/battlezone_1.gif</a:t>
-            </a:r>
-            <a:endParaRPr lang="en-US" sz="1400" dirty="0" smtClean="0"/>
-          </a:p>
-          <a:p>
-            <a:r>
-              <a:rPr lang="en-US" sz="1400" dirty="0" smtClean="0"/>
-              <a:t>[5] </a:t>
-            </a:r>
-            <a:r>
-              <a:rPr lang="en-US" sz="1400" dirty="0" smtClean="0">
-                <a:hlinkClick r:id="rId6"/>
-              </a:rPr>
-              <a:t>http://www.logitech.com/en-us/webcam-communications/webcams/devices/6333</a:t>
-            </a:r>
-            <a:endParaRPr lang="en-US" sz="1400" dirty="0" smtClean="0"/>
-          </a:p>
-          <a:p>
-            <a:pPr>
-              <a:buNone/>
-            </a:pPr>
-            <a:endParaRPr lang="en-US" sz="1400" dirty="0" smtClean="0"/>
-          </a:p>
-          <a:p>
-            <a:pPr>
-              <a:buNone/>
-            </a:pPr>
-            <a:endParaRPr lang="en-US" sz="1800" dirty="0" smtClean="0"/>
-          </a:p>
-          <a:p>
-            <a:endParaRPr lang="en-US" sz="1800" dirty="0" smtClean="0"/>
-          </a:p>
-          <a:p>
-            <a:endParaRPr lang="en-US" sz="1800" dirty="0"/>
+              <a:rPr lang="en-US" dirty="0" smtClean="0"/>
+              <a:t>Robotic drones are a means of performing search and rescue operations in areas which may be hazardous or inaccessible to human personnel</a:t>
+            </a:r>
+            <a:r>
+              <a:rPr lang="en-US" dirty="0" smtClean="0"/>
+              <a:t>.</a:t>
+            </a:r>
+          </a:p>
+          <a:p>
+            <a:endParaRPr lang="en-US" dirty="0"/>
+          </a:p>
+          <a:p>
+            <a:r>
+              <a:rPr lang="en-US" dirty="0" smtClean="0"/>
+              <a:t>A virtual world could be used to collaborate sensor information </a:t>
+            </a:r>
+            <a:r>
+              <a:rPr lang="en-US" dirty="0" smtClean="0"/>
+              <a:t>as </a:t>
+            </a:r>
+            <a:r>
+              <a:rPr lang="en-US" dirty="0" smtClean="0"/>
+              <a:t>well as to coordinate the movements of the drones themselves</a:t>
+            </a:r>
+            <a:r>
+              <a:rPr lang="en-US" dirty="0" smtClean="0"/>
+              <a:t>.</a:t>
+            </a:r>
+          </a:p>
+          <a:p>
+            <a:endParaRPr lang="en-US" dirty="0" smtClean="0"/>
+          </a:p>
+          <a:p>
+            <a:r>
+              <a:rPr lang="en-US" dirty="0" smtClean="0"/>
+              <a:t>A small number of personnel could potentially manage a large number of rescue drones.</a:t>
+            </a:r>
+            <a:endParaRPr lang="en-US" dirty="0"/>
           </a:p>
         </p:txBody>
       </p:sp>
@@ -4414,6 +4438,306 @@
   <p:clrMapOvr>
     <a:masterClrMapping/>
   </p:clrMapOvr>
+  <p:transition>
+    <p:fade/>
+  </p:transition>
+</p:sld>
+</file>
+
+<file path=ppt/slides/slide16.xml><?xml version="1.0" encoding="utf-8"?>
+<p:sld xmlns:a="http://schemas.openxmlformats.org/drawingml/2006/main" xmlns:r="http://schemas.openxmlformats.org/officeDocument/2006/relationships" xmlns:p="http://schemas.openxmlformats.org/presentationml/2006/main">
+  <p:cSld>
+    <p:spTree>
+      <p:nvGrpSpPr>
+        <p:cNvPr id="1" name=""/>
+        <p:cNvGrpSpPr/>
+        <p:nvPr/>
+      </p:nvGrpSpPr>
+      <p:grpSpPr>
+        <a:xfrm>
+          <a:off x="0" y="0"/>
+          <a:ext cx="0" cy="0"/>
+          <a:chOff x="0" y="0"/>
+          <a:chExt cx="0" cy="0"/>
+        </a:xfrm>
+      </p:grpSpPr>
+      <p:sp>
+        <p:nvSpPr>
+          <p:cNvPr id="4" name="Slide Number Placeholder 3"/>
+          <p:cNvSpPr>
+            <a:spLocks noGrp="1"/>
+          </p:cNvSpPr>
+          <p:nvPr>
+            <p:ph type="sldNum" sz="quarter" idx="10"/>
+          </p:nvPr>
+        </p:nvSpPr>
+        <p:spPr/>
+        <p:txBody>
+          <a:bodyPr/>
+          <a:lstStyle/>
+          <a:p>
+            <a:fld id="{284CB430-D7DB-450E-8FF5-AD4ED9D28849}" type="slidenum">
+              <a:rPr lang="en-US"/>
+              <a:pPr/>
+              <a:t>16</a:t>
+            </a:fld>
+            <a:endParaRPr lang="en-US"/>
+          </a:p>
+        </p:txBody>
+      </p:sp>
+      <p:sp>
+        <p:nvSpPr>
+          <p:cNvPr id="4100" name="Rectangle 4"/>
+          <p:cNvSpPr>
+            <a:spLocks noGrp="1" noChangeArrowheads="1"/>
+          </p:cNvSpPr>
+          <p:nvPr>
+            <p:ph type="title"/>
+          </p:nvPr>
+        </p:nvSpPr>
+        <p:spPr/>
+        <p:txBody>
+          <a:bodyPr/>
+          <a:lstStyle/>
+          <a:p>
+            <a:r>
+              <a:rPr lang="en-US" dirty="0" smtClean="0"/>
+              <a:t>Potential Application</a:t>
+            </a:r>
+            <a:br>
+              <a:rPr lang="en-US" dirty="0" smtClean="0"/>
+            </a:br>
+            <a:r>
+              <a:rPr lang="en-US" b="1" dirty="0" smtClean="0"/>
+              <a:t>Security and Surveillance</a:t>
+            </a:r>
+            <a:endParaRPr lang="en-US" b="1" dirty="0"/>
+          </a:p>
+        </p:txBody>
+      </p:sp>
+      <p:sp>
+        <p:nvSpPr>
+          <p:cNvPr id="4101" name="Rectangle 5"/>
+          <p:cNvSpPr>
+            <a:spLocks noGrp="1" noChangeArrowheads="1"/>
+          </p:cNvSpPr>
+          <p:nvPr>
+            <p:ph type="body" idx="1"/>
+          </p:nvPr>
+        </p:nvSpPr>
+        <p:spPr>
+          <a:xfrm>
+            <a:off x="1981200" y="2057400"/>
+            <a:ext cx="6858000" cy="4419600"/>
+          </a:xfrm>
+        </p:spPr>
+        <p:txBody>
+          <a:bodyPr/>
+          <a:lstStyle/>
+          <a:p>
+            <a:r>
+              <a:rPr lang="en-US" dirty="0" smtClean="0"/>
+              <a:t>Robotic drones could be used to augment an existing security system by using a virtual world to collaborate with existing alarm and camera systems.</a:t>
+            </a:r>
+          </a:p>
+          <a:p>
+            <a:endParaRPr lang="en-US" dirty="0" smtClean="0"/>
+          </a:p>
+          <a:p>
+            <a:r>
+              <a:rPr lang="en-US" dirty="0" smtClean="0"/>
+              <a:t>A </a:t>
+            </a:r>
+            <a:r>
+              <a:rPr lang="en-US" dirty="0" smtClean="0"/>
+              <a:t>mobile client ensures that security personnel can operate the drones regardless of their current position when an alarm is triggered.</a:t>
+            </a:r>
+            <a:endParaRPr lang="en-US" dirty="0"/>
+          </a:p>
+        </p:txBody>
+      </p:sp>
+    </p:spTree>
+  </p:cSld>
+  <p:clrMapOvr>
+    <a:masterClrMapping/>
+  </p:clrMapOvr>
+  <p:transition>
+    <p:fade/>
+  </p:transition>
+</p:sld>
+</file>
+
+<file path=ppt/slides/slide17.xml><?xml version="1.0" encoding="utf-8"?>
+<p:sld xmlns:a="http://schemas.openxmlformats.org/drawingml/2006/main" xmlns:r="http://schemas.openxmlformats.org/officeDocument/2006/relationships" xmlns:p="http://schemas.openxmlformats.org/presentationml/2006/main">
+  <p:cSld>
+    <p:spTree>
+      <p:nvGrpSpPr>
+        <p:cNvPr id="1" name=""/>
+        <p:cNvGrpSpPr/>
+        <p:nvPr/>
+      </p:nvGrpSpPr>
+      <p:grpSpPr>
+        <a:xfrm>
+          <a:off x="0" y="0"/>
+          <a:ext cx="0" cy="0"/>
+          <a:chOff x="0" y="0"/>
+          <a:chExt cx="0" cy="0"/>
+        </a:xfrm>
+      </p:grpSpPr>
+      <p:sp>
+        <p:nvSpPr>
+          <p:cNvPr id="4" name="Slide Number Placeholder 3"/>
+          <p:cNvSpPr>
+            <a:spLocks noGrp="1"/>
+          </p:cNvSpPr>
+          <p:nvPr>
+            <p:ph type="sldNum" sz="quarter" idx="10"/>
+          </p:nvPr>
+        </p:nvSpPr>
+        <p:spPr/>
+        <p:txBody>
+          <a:bodyPr/>
+          <a:lstStyle/>
+          <a:p>
+            <a:fld id="{284CB430-D7DB-450E-8FF5-AD4ED9D28849}" type="slidenum">
+              <a:rPr lang="en-US"/>
+              <a:pPr/>
+              <a:t>17</a:t>
+            </a:fld>
+            <a:endParaRPr lang="en-US"/>
+          </a:p>
+        </p:txBody>
+      </p:sp>
+      <p:sp>
+        <p:nvSpPr>
+          <p:cNvPr id="4100" name="Rectangle 4"/>
+          <p:cNvSpPr>
+            <a:spLocks noGrp="1" noChangeArrowheads="1"/>
+          </p:cNvSpPr>
+          <p:nvPr>
+            <p:ph type="title"/>
+          </p:nvPr>
+        </p:nvSpPr>
+        <p:spPr/>
+        <p:txBody>
+          <a:bodyPr/>
+          <a:lstStyle/>
+          <a:p>
+            <a:r>
+              <a:rPr lang="en-US" dirty="0" smtClean="0"/>
+              <a:t>References</a:t>
+            </a:r>
+            <a:endParaRPr lang="en-US" dirty="0"/>
+          </a:p>
+        </p:txBody>
+      </p:sp>
+      <p:sp>
+        <p:nvSpPr>
+          <p:cNvPr id="4101" name="Rectangle 5"/>
+          <p:cNvSpPr>
+            <a:spLocks noGrp="1" noChangeArrowheads="1"/>
+          </p:cNvSpPr>
+          <p:nvPr>
+            <p:ph type="body" idx="1"/>
+          </p:nvPr>
+        </p:nvSpPr>
+        <p:spPr/>
+        <p:txBody>
+          <a:bodyPr/>
+          <a:lstStyle/>
+          <a:p>
+            <a:r>
+              <a:rPr lang="en-US" sz="1400" dirty="0" smtClean="0"/>
+              <a:t>[1] </a:t>
+            </a:r>
+            <a:r>
+              <a:rPr lang="en-US" sz="1400" dirty="0" smtClean="0">
+                <a:hlinkClick r:id="rId2"/>
+              </a:rPr>
+              <a:t>http://www.htc.com/www/product/desire/specification.html</a:t>
+            </a:r>
+            <a:endParaRPr lang="en-US" sz="1400" dirty="0" smtClean="0"/>
+          </a:p>
+          <a:p>
+            <a:r>
+              <a:rPr lang="en-US" sz="1400" dirty="0" smtClean="0"/>
+              <a:t>[2] </a:t>
+            </a:r>
+            <a:r>
+              <a:rPr lang="en-US" sz="1400" dirty="0" smtClean="0">
+                <a:hlinkClick r:id="rId3"/>
+              </a:rPr>
+              <a:t>http://mindstorms.lego.com/en-us/products/default.aspx</a:t>
+            </a:r>
+            <a:endParaRPr lang="en-US" sz="1400" dirty="0" smtClean="0"/>
+          </a:p>
+          <a:p>
+            <a:r>
+              <a:rPr lang="en-US" sz="1400" dirty="0" smtClean="0"/>
+              <a:t>[3] </a:t>
+            </a:r>
+            <a:r>
+              <a:rPr lang="en-US" sz="1400" dirty="0" smtClean="0">
+                <a:hlinkClick r:id="rId4"/>
+              </a:rPr>
+              <a:t>http://static.guim.co.uk/sys-images/Technology/Pix/pictures/2009/4/21/1240307015871/Tron-001.jpg</a:t>
+            </a:r>
+            <a:endParaRPr lang="en-US" sz="1400" dirty="0" smtClean="0"/>
+          </a:p>
+          <a:p>
+            <a:r>
+              <a:rPr lang="en-US" sz="1400" dirty="0" smtClean="0"/>
+              <a:t>[4] </a:t>
+            </a:r>
+            <a:r>
+              <a:rPr lang="en-US" sz="1400" dirty="0" smtClean="0">
+                <a:hlinkClick r:id="rId5"/>
+              </a:rPr>
+              <a:t>http://1.bp.blogspot.com/_s0SSX3Y2JTw/S-Cv_6lfKVI/AAAAAAAAFE8/SUlrHiF5RUg/s1600/battlezone_1.gif</a:t>
+            </a:r>
+            <a:endParaRPr lang="en-US" sz="1400" dirty="0" smtClean="0"/>
+          </a:p>
+          <a:p>
+            <a:r>
+              <a:rPr lang="en-US" sz="1400" dirty="0" smtClean="0"/>
+              <a:t>[5] </a:t>
+            </a:r>
+            <a:r>
+              <a:rPr lang="en-US" sz="1400" dirty="0" smtClean="0">
+                <a:hlinkClick r:id="rId6"/>
+              </a:rPr>
+              <a:t>http://www.logitech.com/en-us/webcam-communications/webcams/devices/6333</a:t>
+            </a:r>
+            <a:endParaRPr lang="en-US" sz="1400" dirty="0" smtClean="0"/>
+          </a:p>
+          <a:p>
+            <a:pPr>
+              <a:buNone/>
+            </a:pPr>
+            <a:endParaRPr lang="en-US" sz="1400" dirty="0" smtClean="0"/>
+          </a:p>
+          <a:p>
+            <a:pPr>
+              <a:buNone/>
+            </a:pPr>
+            <a:endParaRPr lang="en-US" sz="1800" dirty="0" smtClean="0"/>
+          </a:p>
+          <a:p>
+            <a:endParaRPr lang="en-US" sz="1800" dirty="0" smtClean="0"/>
+          </a:p>
+          <a:p>
+            <a:endParaRPr lang="en-US" sz="1800" dirty="0"/>
+          </a:p>
+        </p:txBody>
+      </p:sp>
+    </p:spTree>
+  </p:cSld>
+  <p:clrMapOvr>
+    <a:masterClrMapping/>
+  </p:clrMapOvr>
+  <p:transition>
+    <p:fade/>
+  </p:transition>
 </p:sld>
 </file>
 
@@ -4877,6 +5201,9 @@
   <p:clrMapOvr>
     <a:masterClrMapping/>
   </p:clrMapOvr>
+  <p:transition>
+    <p:fade/>
+  </p:transition>
 </p:sld>
 </file>
 
@@ -4966,6 +5293,17 @@
           <a:p>
             <a:pPr lvl="0"/>
             <a:r>
+              <a:rPr lang="en-CA" dirty="0" smtClean="0">
+                <a:solidFill>
+                  <a:schemeClr val="tx1"/>
+                </a:solidFill>
+                <a:latin typeface="+mn-lt"/>
+                <a:ea typeface="+mn-ea"/>
+                <a:cs typeface="+mn-cs"/>
+              </a:rPr>
+              <a:t>To develop </a:t>
+            </a:r>
+            <a:r>
               <a:rPr lang="en-CA" dirty="0">
                 <a:solidFill>
                   <a:schemeClr val="tx1"/>
@@ -4974,7 +5312,7 @@
                 <a:ea typeface="+mn-ea"/>
                 <a:cs typeface="+mn-cs"/>
               </a:rPr>
-              <a:t>The first project objective is to develop a robotics control system which is both intuitive to use and is implemented on a mobile platform that is widely available and used by the public</a:t>
+              <a:t>a robotics control system which is both intuitive to use and is implemented on a mobile platform that is widely available and used by the public</a:t>
             </a:r>
             <a:r>
               <a:rPr lang="en-CA" dirty="0" smtClean="0">
@@ -5002,6 +5340,17 @@
           <a:p>
             <a:pPr lvl="0"/>
             <a:r>
+              <a:rPr lang="en-CA" dirty="0" smtClean="0">
+                <a:solidFill>
+                  <a:schemeClr val="tx1"/>
+                </a:solidFill>
+                <a:latin typeface="+mn-lt"/>
+                <a:ea typeface="+mn-ea"/>
+                <a:cs typeface="+mn-cs"/>
+              </a:rPr>
+              <a:t>To experiment </a:t>
+            </a:r>
+            <a:r>
               <a:rPr lang="en-CA" dirty="0">
                 <a:solidFill>
                   <a:schemeClr val="tx1"/>
@@ -5010,7 +5359,7 @@
                 <a:ea typeface="+mn-ea"/>
                 <a:cs typeface="+mn-cs"/>
               </a:rPr>
-              <a:t>The second project objective is to experiment with the combination of live video and virtually generated, overlaid imagery to enhance the ease of use and feature set of a robotics control system. This technology is commonly referred to as </a:t>
+              <a:t>with the combination of live video and virtually generated, overlaid imagery to enhance the ease of use and feature set of a robotics control system. This technology is commonly referred to as </a:t>
             </a:r>
             <a:r>
               <a:rPr lang="en-CA" b="1" dirty="0">
@@ -5045,6 +5394,9 @@
   <p:clrMapOvr>
     <a:masterClrMapping/>
   </p:clrMapOvr>
+  <p:transition>
+    <p:fade/>
+  </p:transition>
 </p:sld>
 </file>
 
@@ -5134,6 +5486,17 @@
           <a:p>
             <a:pPr lvl="0"/>
             <a:r>
+              <a:rPr lang="en-CA" dirty="0" smtClean="0">
+                <a:solidFill>
+                  <a:schemeClr val="tx1"/>
+                </a:solidFill>
+                <a:latin typeface="+mn-lt"/>
+                <a:ea typeface="+mn-ea"/>
+                <a:cs typeface="+mn-cs"/>
+              </a:rPr>
+              <a:t>The project </a:t>
+            </a:r>
+            <a:r>
               <a:rPr lang="en-CA" dirty="0">
                 <a:solidFill>
                   <a:schemeClr val="tx1"/>
@@ -5142,7 +5505,7 @@
                 <a:ea typeface="+mn-ea"/>
                 <a:cs typeface="+mn-cs"/>
               </a:rPr>
-              <a:t>To combine these objectives, the project aims to create a system which </a:t>
+              <a:t>aims to create a system which </a:t>
             </a:r>
             <a:r>
               <a:rPr lang="en-CA" dirty="0" smtClean="0">
@@ -5164,7 +5527,51 @@
                 <a:ea typeface="+mn-ea"/>
                 <a:cs typeface="+mn-cs"/>
               </a:rPr>
-              <a:t>remotely controlled robots to share and interact with a simple virtual world which will be rendered on to a live video feed and displayed to </a:t>
+              <a:t>remotely controlled robots to share and interact with a simple virtual </a:t>
+            </a:r>
+            <a:r>
+              <a:rPr lang="en-CA" dirty="0" smtClean="0">
+                <a:solidFill>
+                  <a:schemeClr val="tx1"/>
+                </a:solidFill>
+                <a:latin typeface="+mn-lt"/>
+                <a:ea typeface="+mn-ea"/>
+                <a:cs typeface="+mn-cs"/>
+              </a:rPr>
+              <a:t>world, </a:t>
+            </a:r>
+            <a:r>
+              <a:rPr lang="en-CA" dirty="0">
+                <a:solidFill>
+                  <a:schemeClr val="tx1"/>
+                </a:solidFill>
+                <a:latin typeface="+mn-lt"/>
+                <a:ea typeface="+mn-ea"/>
+                <a:cs typeface="+mn-cs"/>
+              </a:rPr>
+              <a:t>which will be rendered </a:t>
+            </a:r>
+            <a:r>
+              <a:rPr lang="en-CA" dirty="0" smtClean="0">
+                <a:solidFill>
+                  <a:schemeClr val="tx1"/>
+                </a:solidFill>
+                <a:latin typeface="+mn-lt"/>
+                <a:ea typeface="+mn-ea"/>
+                <a:cs typeface="+mn-cs"/>
+              </a:rPr>
+              <a:t>overtop of </a:t>
+            </a:r>
+            <a:r>
+              <a:rPr lang="en-CA" dirty="0">
+                <a:solidFill>
+                  <a:schemeClr val="tx1"/>
+                </a:solidFill>
+                <a:latin typeface="+mn-lt"/>
+                <a:ea typeface="+mn-ea"/>
+                <a:cs typeface="+mn-cs"/>
+              </a:rPr>
+              <a:t>a live video feed and displayed to </a:t>
             </a:r>
             <a:r>
               <a:rPr lang="en-CA" dirty="0" smtClean="0"/>
@@ -5181,7 +5588,14 @@
               </a:rPr>
               <a:t>. </a:t>
             </a:r>
-            <a:endParaRPr lang="en-US" dirty="0"/>
+            <a:endParaRPr lang="en-CA" dirty="0" smtClean="0">
+              <a:solidFill>
+                <a:schemeClr val="tx1"/>
+              </a:solidFill>
+              <a:latin typeface="+mn-lt"/>
+              <a:ea typeface="+mn-ea"/>
+              <a:cs typeface="+mn-cs"/>
+            </a:endParaRPr>
           </a:p>
         </p:txBody>
       </p:sp>
@@ -5190,6 +5604,9 @@
   <p:clrMapOvr>
     <a:masterClrMapping/>
   </p:clrMapOvr>
+  <p:transition>
+    <p:fade/>
+  </p:transition>
 </p:sld>
 </file>
 
@@ -5229,6 +5646,109 @@
               <a:rPr lang="en-US"/>
               <a:pPr/>
               <a:t>5</a:t>
+            </a:fld>
+            <a:endParaRPr lang="en-US"/>
+          </a:p>
+        </p:txBody>
+      </p:sp>
+      <p:sp>
+        <p:nvSpPr>
+          <p:cNvPr id="4100" name="Rectangle 4"/>
+          <p:cNvSpPr>
+            <a:spLocks noGrp="1" noChangeArrowheads="1"/>
+          </p:cNvSpPr>
+          <p:nvPr>
+            <p:ph type="title"/>
+          </p:nvPr>
+        </p:nvSpPr>
+        <p:spPr/>
+        <p:txBody>
+          <a:bodyPr/>
+          <a:lstStyle/>
+          <a:p>
+            <a:r>
+              <a:rPr lang="en-US" dirty="0" smtClean="0"/>
+              <a:t>Solution - System </a:t>
+            </a:r>
+            <a:r>
+              <a:rPr lang="en-US" dirty="0" smtClean="0"/>
+              <a:t>Architecture</a:t>
+            </a:r>
+            <a:endParaRPr lang="en-US" dirty="0"/>
+          </a:p>
+        </p:txBody>
+      </p:sp>
+      <p:pic>
+        <p:nvPicPr>
+          <p:cNvPr id="6" name="Picture 5" descr="architecture_diagram.jpg"/>
+          <p:cNvPicPr>
+            <a:picLocks noChangeAspect="1"/>
+          </p:cNvPicPr>
+          <p:nvPr/>
+        </p:nvPicPr>
+        <p:blipFill>
+          <a:blip r:embed="rId2" cstate="print"/>
+          <a:stretch>
+            <a:fillRect/>
+          </a:stretch>
+        </p:blipFill>
+        <p:spPr>
+          <a:xfrm>
+            <a:off x="1886851" y="1600200"/>
+            <a:ext cx="7028549" cy="4800599"/>
+          </a:xfrm>
+          <a:prstGeom prst="rect">
+            <a:avLst/>
+          </a:prstGeom>
+        </p:spPr>
+      </p:pic>
+    </p:spTree>
+  </p:cSld>
+  <p:clrMapOvr>
+    <a:masterClrMapping/>
+  </p:clrMapOvr>
+  <p:transition>
+    <p:fade/>
+  </p:transition>
+</p:sld>
+</file>
+
+<file path=ppt/slides/slide6.xml><?xml version="1.0" encoding="utf-8"?>
+<p:sld xmlns:a="http://schemas.openxmlformats.org/drawingml/2006/main" xmlns:r="http://schemas.openxmlformats.org/officeDocument/2006/relationships" xmlns:p="http://schemas.openxmlformats.org/presentationml/2006/main">
+  <p:cSld>
+    <p:spTree>
+      <p:nvGrpSpPr>
+        <p:cNvPr id="1" name=""/>
+        <p:cNvGrpSpPr/>
+        <p:nvPr/>
+      </p:nvGrpSpPr>
+      <p:grpSpPr>
+        <a:xfrm>
+          <a:off x="0" y="0"/>
+          <a:ext cx="0" cy="0"/>
+          <a:chOff x="0" y="0"/>
+          <a:chExt cx="0" cy="0"/>
+        </a:xfrm>
+      </p:grpSpPr>
+      <p:sp>
+        <p:nvSpPr>
+          <p:cNvPr id="4" name="Slide Number Placeholder 3"/>
+          <p:cNvSpPr>
+            <a:spLocks noGrp="1"/>
+          </p:cNvSpPr>
+          <p:nvPr>
+            <p:ph type="sldNum" sz="quarter" idx="10"/>
+          </p:nvPr>
+        </p:nvSpPr>
+        <p:spPr/>
+        <p:txBody>
+          <a:bodyPr/>
+          <a:lstStyle/>
+          <a:p>
+            <a:fld id="{284CB430-D7DB-450E-8FF5-AD4ED9D28849}" type="slidenum">
+              <a:rPr lang="en-US"/>
+              <a:pPr/>
+              <a:t>6</a:t>
             </a:fld>
             <a:endParaRPr lang="en-US"/>
           </a:p>
@@ -5650,10 +6170,13 @@
   <p:clrMapOvr>
     <a:masterClrMapping/>
   </p:clrMapOvr>
+  <p:transition>
+    <p:fade/>
+  </p:transition>
 </p:sld>
 </file>
 
-<file path=ppt/slides/slide6.xml><?xml version="1.0" encoding="utf-8"?>
+<file path=ppt/slides/slide7.xml><?xml version="1.0" encoding="utf-8"?>
 <p:sld xmlns:a="http://schemas.openxmlformats.org/drawingml/2006/main" xmlns:r="http://schemas.openxmlformats.org/officeDocument/2006/relationships" xmlns:p="http://schemas.openxmlformats.org/presentationml/2006/main">
   <p:cSld>
     <p:spTree>
@@ -5688,7 +6211,7 @@
             <a:fld id="{284CB430-D7DB-450E-8FF5-AD4ED9D28849}" type="slidenum">
               <a:rPr lang="en-US"/>
               <a:pPr/>
-              <a:t>6</a:t>
+              <a:t>7</a:t>
             </a:fld>
             <a:endParaRPr lang="en-US"/>
           </a:p>
@@ -5916,10 +6439,13 @@
   <p:clrMapOvr>
     <a:masterClrMapping/>
   </p:clrMapOvr>
+  <p:transition>
+    <p:fade/>
+  </p:transition>
 </p:sld>
 </file>
 
-<file path=ppt/slides/slide7.xml><?xml version="1.0" encoding="utf-8"?>
+<file path=ppt/slides/slide8.xml><?xml version="1.0" encoding="utf-8"?>
 <p:sld xmlns:a="http://schemas.openxmlformats.org/drawingml/2006/main" xmlns:r="http://schemas.openxmlformats.org/officeDocument/2006/relationships" xmlns:p="http://schemas.openxmlformats.org/presentationml/2006/main">
   <p:cSld>
     <p:spTree>
@@ -5954,7 +6480,7 @@
             <a:fld id="{284CB430-D7DB-450E-8FF5-AD4ED9D28849}" type="slidenum">
               <a:rPr lang="en-US"/>
               <a:pPr/>
-              <a:t>7</a:t>
+              <a:t>8</a:t>
             </a:fld>
             <a:endParaRPr lang="en-US" dirty="0"/>
           </a:p>
@@ -6235,10 +6761,13 @@
   <p:clrMapOvr>
     <a:masterClrMapping/>
   </p:clrMapOvr>
+  <p:transition>
+    <p:fade/>
+  </p:transition>
 </p:sld>
 </file>
 
-<file path=ppt/slides/slide8.xml><?xml version="1.0" encoding="utf-8"?>
+<file path=ppt/slides/slide9.xml><?xml version="1.0" encoding="utf-8"?>
 <p:sld xmlns:a="http://schemas.openxmlformats.org/drawingml/2006/main" xmlns:r="http://schemas.openxmlformats.org/officeDocument/2006/relationships" xmlns:p="http://schemas.openxmlformats.org/presentationml/2006/main">
   <p:cSld>
     <p:spTree>
@@ -6273,7 +6802,7 @@
             <a:fld id="{284CB430-D7DB-450E-8FF5-AD4ED9D28849}" type="slidenum">
               <a:rPr lang="en-US"/>
               <a:pPr/>
-              <a:t>8</a:t>
+              <a:t>9</a:t>
             </a:fld>
             <a:endParaRPr lang="en-US"/>
           </a:p>
@@ -6492,114 +7021,9 @@
   <p:clrMapOvr>
     <a:masterClrMapping/>
   </p:clrMapOvr>
-</p:sld>
-</file>
-
-<file path=ppt/slides/slide9.xml><?xml version="1.0" encoding="utf-8"?>
-<p:sld xmlns:a="http://schemas.openxmlformats.org/drawingml/2006/main" xmlns:r="http://schemas.openxmlformats.org/officeDocument/2006/relationships" xmlns:p="http://schemas.openxmlformats.org/presentationml/2006/main">
-  <p:cSld>
-    <p:spTree>
-      <p:nvGrpSpPr>
-        <p:cNvPr id="1" name=""/>
-        <p:cNvGrpSpPr/>
-        <p:nvPr/>
-      </p:nvGrpSpPr>
-      <p:grpSpPr>
-        <a:xfrm>
-          <a:off x="0" y="0"/>
-          <a:ext cx="0" cy="0"/>
-          <a:chOff x="0" y="0"/>
-          <a:chExt cx="0" cy="0"/>
-        </a:xfrm>
-      </p:grpSpPr>
-      <p:sp>
-        <p:nvSpPr>
-          <p:cNvPr id="4" name="Slide Number Placeholder 3"/>
-          <p:cNvSpPr>
-            <a:spLocks noGrp="1"/>
-          </p:cNvSpPr>
-          <p:nvPr>
-            <p:ph type="sldNum" sz="quarter" idx="10"/>
-          </p:nvPr>
-        </p:nvSpPr>
-        <p:spPr/>
-        <p:txBody>
-          <a:bodyPr/>
-          <a:lstStyle/>
-          <a:p>
-            <a:fld id="{284CB430-D7DB-450E-8FF5-AD4ED9D28849}" type="slidenum">
-              <a:rPr lang="en-US"/>
-              <a:pPr/>
-              <a:t>9</a:t>
-            </a:fld>
-            <a:endParaRPr lang="en-US"/>
-          </a:p>
-        </p:txBody>
-      </p:sp>
-      <p:sp>
-        <p:nvSpPr>
-          <p:cNvPr id="4100" name="Rectangle 4"/>
-          <p:cNvSpPr>
-            <a:spLocks noGrp="1" noChangeArrowheads="1"/>
-          </p:cNvSpPr>
-          <p:nvPr>
-            <p:ph type="title"/>
-          </p:nvPr>
-        </p:nvSpPr>
-        <p:spPr/>
-        <p:txBody>
-          <a:bodyPr/>
-          <a:lstStyle/>
-          <a:p>
-            <a:r>
-              <a:rPr lang="en-US" dirty="0" smtClean="0"/>
-              <a:t>Solution – How it Works</a:t>
-            </a:r>
-            <a:endParaRPr lang="en-US" dirty="0"/>
-          </a:p>
-        </p:txBody>
-      </p:sp>
-      <p:sp>
-        <p:nvSpPr>
-          <p:cNvPr id="4101" name="Rectangle 5"/>
-          <p:cNvSpPr>
-            <a:spLocks noGrp="1" noChangeArrowheads="1"/>
-          </p:cNvSpPr>
-          <p:nvPr>
-            <p:ph type="body" idx="1"/>
-          </p:nvPr>
-        </p:nvSpPr>
-        <p:spPr>
-          <a:xfrm>
-            <a:off x="1981200" y="1676400"/>
-            <a:ext cx="6858000" cy="4419600"/>
-          </a:xfrm>
-        </p:spPr>
-        <p:txBody>
-          <a:bodyPr/>
-          <a:lstStyle/>
-          <a:p>
-            <a:r>
-              <a:rPr lang="en-US" dirty="0" smtClean="0"/>
-              <a:t>The mobile client uses OpenGL to render 3D imagery corresponding to the virtual world state on top of the received live video feed.</a:t>
-            </a:r>
-          </a:p>
-          <a:p>
-            <a:endParaRPr lang="en-US" dirty="0" smtClean="0"/>
-          </a:p>
-          <a:p>
-            <a:r>
-              <a:rPr lang="en-US" dirty="0" smtClean="0"/>
-              <a:t>The end user uses either an on-screen button display or the tilt sensors in their smartphone to send movement commands to their paired robot.</a:t>
-            </a:r>
-          </a:p>
-        </p:txBody>
-      </p:sp>
-    </p:spTree>
-  </p:cSld>
-  <p:clrMapOvr>
-    <a:masterClrMapping/>
-  </p:clrMapOvr>
+  <p:transition>
+    <p:fade/>
+  </p:transition>
 </p:sld>
 </file>
 

</xml_diff>

<commit_message>
Further revisions to my slides.
</commit_message>
<xml_diff>
--- a/docs/presentation_slides/RoboWarsPresentation_AlexCraig.pptx
+++ b/docs/presentation_slides/RoboWarsPresentation_AlexCraig.pptx
@@ -22,8 +22,8 @@
     <p:sldId id="267" r:id="rId10"/>
     <p:sldId id="268" r:id="rId11"/>
     <p:sldId id="275" r:id="rId12"/>
-    <p:sldId id="265" r:id="rId13"/>
-    <p:sldId id="276" r:id="rId14"/>
+    <p:sldId id="276" r:id="rId13"/>
+    <p:sldId id="265" r:id="rId14"/>
     <p:sldId id="272" r:id="rId15"/>
     <p:sldId id="273" r:id="rId16"/>
     <p:sldId id="274" r:id="rId17"/>
@@ -796,6 +796,310 @@
     </a:lvl9pPr>
   </p:notesStyle>
 </p:notesMaster>
+</file>
+
+<file path=ppt/notesSlides/notesSlide1.xml><?xml version="1.0" encoding="utf-8"?>
+<p:notes xmlns:a="http://schemas.openxmlformats.org/drawingml/2006/main" xmlns:r="http://schemas.openxmlformats.org/officeDocument/2006/relationships" xmlns:p="http://schemas.openxmlformats.org/presentationml/2006/main">
+  <p:cSld>
+    <p:spTree>
+      <p:nvGrpSpPr>
+        <p:cNvPr id="1" name=""/>
+        <p:cNvGrpSpPr/>
+        <p:nvPr/>
+      </p:nvGrpSpPr>
+      <p:grpSpPr>
+        <a:xfrm>
+          <a:off x="0" y="0"/>
+          <a:ext cx="0" cy="0"/>
+          <a:chOff x="0" y="0"/>
+          <a:chExt cx="0" cy="0"/>
+        </a:xfrm>
+      </p:grpSpPr>
+      <p:sp>
+        <p:nvSpPr>
+          <p:cNvPr id="2" name="Slide Image Placeholder 1"/>
+          <p:cNvSpPr>
+            <a:spLocks noGrp="1" noRot="1" noChangeAspect="1"/>
+          </p:cNvSpPr>
+          <p:nvPr>
+            <p:ph type="sldImg"/>
+          </p:nvPr>
+        </p:nvSpPr>
+        <p:spPr/>
+      </p:sp>
+      <p:sp>
+        <p:nvSpPr>
+          <p:cNvPr id="3" name="Notes Placeholder 2"/>
+          <p:cNvSpPr>
+            <a:spLocks noGrp="1"/>
+          </p:cNvSpPr>
+          <p:nvPr>
+            <p:ph type="body" idx="1"/>
+          </p:nvPr>
+        </p:nvSpPr>
+        <p:spPr/>
+        <p:txBody>
+          <a:bodyPr>
+            <a:normAutofit/>
+          </a:bodyPr>
+          <a:lstStyle/>
+          <a:p>
+            <a:pPr>
+              <a:buFontTx/>
+              <a:buChar char="-"/>
+            </a:pPr>
+            <a:r>
+              <a:rPr lang="en-CA" dirty="0" smtClean="0"/>
+              <a:t>Remote</a:t>
+            </a:r>
+            <a:r>
+              <a:rPr lang="en-CA" baseline="0" dirty="0" smtClean="0"/>
+              <a:t> users from any internet capable location</a:t>
+            </a:r>
+          </a:p>
+          <a:p>
+            <a:pPr>
+              <a:buFontTx/>
+              <a:buChar char="-"/>
+            </a:pPr>
+            <a:endParaRPr lang="en-CA" baseline="0" dirty="0" smtClean="0"/>
+          </a:p>
+          <a:p>
+            <a:pPr>
+              <a:buFontTx/>
+              <a:buChar char="-"/>
+            </a:pPr>
+            <a:r>
+              <a:rPr lang="en-CA" baseline="0" dirty="0" smtClean="0"/>
+              <a:t> Connect to our server and use our robotics kits</a:t>
+            </a:r>
+          </a:p>
+          <a:p>
+            <a:pPr>
+              <a:buFontTx/>
+              <a:buChar char="-"/>
+            </a:pPr>
+            <a:endParaRPr lang="en-CA" baseline="0" dirty="0" smtClean="0"/>
+          </a:p>
+          <a:p>
+            <a:pPr>
+              <a:buFontTx/>
+              <a:buChar char="-"/>
+            </a:pPr>
+            <a:r>
+              <a:rPr lang="en-CA" baseline="0" dirty="0" smtClean="0"/>
+              <a:t> Interact with a simple virtual world</a:t>
+            </a:r>
+            <a:endParaRPr lang="en-CA" dirty="0"/>
+          </a:p>
+        </p:txBody>
+      </p:sp>
+      <p:sp>
+        <p:nvSpPr>
+          <p:cNvPr id="4" name="Slide Number Placeholder 3"/>
+          <p:cNvSpPr>
+            <a:spLocks noGrp="1"/>
+          </p:cNvSpPr>
+          <p:nvPr>
+            <p:ph type="sldNum" sz="quarter" idx="10"/>
+          </p:nvPr>
+        </p:nvSpPr>
+        <p:spPr/>
+        <p:txBody>
+          <a:bodyPr/>
+          <a:lstStyle/>
+          <a:p>
+            <a:fld id="{E00E7371-80A2-4894-A71A-E39284D7ECA2}" type="slidenum">
+              <a:rPr lang="en-US" smtClean="0"/>
+              <a:pPr/>
+              <a:t>4</a:t>
+            </a:fld>
+            <a:endParaRPr lang="en-US"/>
+          </a:p>
+        </p:txBody>
+      </p:sp>
+    </p:spTree>
+  </p:cSld>
+  <p:clrMapOvr>
+    <a:masterClrMapping/>
+  </p:clrMapOvr>
+</p:notes>
+</file>
+
+<file path=ppt/notesSlides/notesSlide2.xml><?xml version="1.0" encoding="utf-8"?>
+<p:notes xmlns:a="http://schemas.openxmlformats.org/drawingml/2006/main" xmlns:r="http://schemas.openxmlformats.org/officeDocument/2006/relationships" xmlns:p="http://schemas.openxmlformats.org/presentationml/2006/main">
+  <p:cSld>
+    <p:spTree>
+      <p:nvGrpSpPr>
+        <p:cNvPr id="1" name=""/>
+        <p:cNvGrpSpPr/>
+        <p:nvPr/>
+      </p:nvGrpSpPr>
+      <p:grpSpPr>
+        <a:xfrm>
+          <a:off x="0" y="0"/>
+          <a:ext cx="0" cy="0"/>
+          <a:chOff x="0" y="0"/>
+          <a:chExt cx="0" cy="0"/>
+        </a:xfrm>
+      </p:grpSpPr>
+      <p:sp>
+        <p:nvSpPr>
+          <p:cNvPr id="2" name="Slide Image Placeholder 1"/>
+          <p:cNvSpPr>
+            <a:spLocks noGrp="1" noRot="1" noChangeAspect="1"/>
+          </p:cNvSpPr>
+          <p:nvPr>
+            <p:ph type="sldImg"/>
+          </p:nvPr>
+        </p:nvSpPr>
+        <p:spPr/>
+      </p:sp>
+      <p:sp>
+        <p:nvSpPr>
+          <p:cNvPr id="3" name="Notes Placeholder 2"/>
+          <p:cNvSpPr>
+            <a:spLocks noGrp="1"/>
+          </p:cNvSpPr>
+          <p:nvPr>
+            <p:ph type="body" idx="1"/>
+          </p:nvPr>
+        </p:nvSpPr>
+        <p:spPr/>
+        <p:txBody>
+          <a:bodyPr>
+            <a:normAutofit/>
+          </a:bodyPr>
+          <a:lstStyle/>
+          <a:p>
+            <a:r>
+              <a:rPr lang="en-CA" dirty="0" smtClean="0"/>
+              <a:t>- Try to</a:t>
+            </a:r>
+            <a:r>
+              <a:rPr lang="en-CA" baseline="0" dirty="0" smtClean="0"/>
+              <a:t> avoid talking about robot arena</a:t>
+            </a:r>
+            <a:endParaRPr lang="en-CA" dirty="0"/>
+          </a:p>
+        </p:txBody>
+      </p:sp>
+      <p:sp>
+        <p:nvSpPr>
+          <p:cNvPr id="4" name="Slide Number Placeholder 3"/>
+          <p:cNvSpPr>
+            <a:spLocks noGrp="1"/>
+          </p:cNvSpPr>
+          <p:nvPr>
+            <p:ph type="sldNum" sz="quarter" idx="10"/>
+          </p:nvPr>
+        </p:nvSpPr>
+        <p:spPr/>
+        <p:txBody>
+          <a:bodyPr/>
+          <a:lstStyle/>
+          <a:p>
+            <a:fld id="{E00E7371-80A2-4894-A71A-E39284D7ECA2}" type="slidenum">
+              <a:rPr lang="en-US" smtClean="0"/>
+              <a:pPr/>
+              <a:t>5</a:t>
+            </a:fld>
+            <a:endParaRPr lang="en-US"/>
+          </a:p>
+        </p:txBody>
+      </p:sp>
+    </p:spTree>
+  </p:cSld>
+  <p:clrMapOvr>
+    <a:masterClrMapping/>
+  </p:clrMapOvr>
+</p:notes>
+</file>
+
+<file path=ppt/notesSlides/notesSlide3.xml><?xml version="1.0" encoding="utf-8"?>
+<p:notes xmlns:a="http://schemas.openxmlformats.org/drawingml/2006/main" xmlns:r="http://schemas.openxmlformats.org/officeDocument/2006/relationships" xmlns:p="http://schemas.openxmlformats.org/presentationml/2006/main">
+  <p:cSld>
+    <p:spTree>
+      <p:nvGrpSpPr>
+        <p:cNvPr id="1" name=""/>
+        <p:cNvGrpSpPr/>
+        <p:nvPr/>
+      </p:nvGrpSpPr>
+      <p:grpSpPr>
+        <a:xfrm>
+          <a:off x="0" y="0"/>
+          <a:ext cx="0" cy="0"/>
+          <a:chOff x="0" y="0"/>
+          <a:chExt cx="0" cy="0"/>
+        </a:xfrm>
+      </p:grpSpPr>
+      <p:sp>
+        <p:nvSpPr>
+          <p:cNvPr id="2" name="Slide Image Placeholder 1"/>
+          <p:cNvSpPr>
+            <a:spLocks noGrp="1" noRot="1" noChangeAspect="1"/>
+          </p:cNvSpPr>
+          <p:nvPr>
+            <p:ph type="sldImg"/>
+          </p:nvPr>
+        </p:nvSpPr>
+        <p:spPr/>
+      </p:sp>
+      <p:sp>
+        <p:nvSpPr>
+          <p:cNvPr id="3" name="Notes Placeholder 2"/>
+          <p:cNvSpPr>
+            <a:spLocks noGrp="1"/>
+          </p:cNvSpPr>
+          <p:nvPr>
+            <p:ph type="body" idx="1"/>
+          </p:nvPr>
+        </p:nvSpPr>
+        <p:spPr/>
+        <p:txBody>
+          <a:bodyPr>
+            <a:normAutofit/>
+          </a:bodyPr>
+          <a:lstStyle/>
+          <a:p>
+            <a:r>
+              <a:rPr lang="en-CA" dirty="0" smtClean="0"/>
+              <a:t>- FIX</a:t>
+            </a:r>
+            <a:endParaRPr lang="en-CA" dirty="0"/>
+          </a:p>
+        </p:txBody>
+      </p:sp>
+      <p:sp>
+        <p:nvSpPr>
+          <p:cNvPr id="4" name="Slide Number Placeholder 3"/>
+          <p:cNvSpPr>
+            <a:spLocks noGrp="1"/>
+          </p:cNvSpPr>
+          <p:nvPr>
+            <p:ph type="sldNum" sz="quarter" idx="10"/>
+          </p:nvPr>
+        </p:nvSpPr>
+        <p:spPr/>
+        <p:txBody>
+          <a:bodyPr/>
+          <a:lstStyle/>
+          <a:p>
+            <a:fld id="{E00E7371-80A2-4894-A71A-E39284D7ECA2}" type="slidenum">
+              <a:rPr lang="en-US" smtClean="0"/>
+              <a:pPr/>
+              <a:t>11</a:t>
+            </a:fld>
+            <a:endParaRPr lang="en-US"/>
+          </a:p>
+        </p:txBody>
+      </p:sp>
+    </p:spTree>
+  </p:cSld>
+  <p:clrMapOvr>
+    <a:masterClrMapping/>
+  </p:clrMapOvr>
+</p:notes>
 </file>
 
 <file path=ppt/slideLayouts/slideLayout1.xml><?xml version="1.0" encoding="utf-8"?>
@@ -3727,6 +4031,13 @@
   <p:transition>
     <p:fade/>
   </p:transition>
+  <p:timing>
+    <p:tnLst>
+      <p:par>
+        <p:cTn id="1" dur="indefinite" restart="never" nodeType="tmRoot"/>
+      </p:par>
+    </p:tnLst>
+  </p:timing>
 </p:sld>
 </file>
 
@@ -3838,6 +4149,13 @@
   <p:transition>
     <p:fade/>
   </p:transition>
+  <p:timing>
+    <p:tnLst>
+      <p:par>
+        <p:cTn id="1" dur="indefinite" restart="never" nodeType="tmRoot"/>
+      </p:par>
+    </p:tnLst>
+  </p:timing>
 </p:sld>
 </file>
 
@@ -3899,11 +4217,7 @@
           <a:p>
             <a:r>
               <a:rPr lang="en-US" dirty="0" smtClean="0"/>
-              <a:t>Solution - System </a:t>
-            </a:r>
-            <a:r>
-              <a:rPr lang="en-US" dirty="0" smtClean="0"/>
-              <a:t>Architecture</a:t>
+              <a:t>Solution - System Architecture</a:t>
             </a:r>
             <a:endParaRPr lang="en-US" dirty="0"/>
           </a:p>
@@ -3918,7 +4232,7 @@
           <p:nvPr/>
         </p:nvPicPr>
         <p:blipFill>
-          <a:blip r:embed="rId2" cstate="print"/>
+          <a:blip r:embed="rId3" cstate="print"/>
           <a:stretch>
             <a:fillRect/>
           </a:stretch>
@@ -3941,6 +4255,13 @@
   <p:transition>
     <p:fade/>
   </p:transition>
+  <p:timing>
+    <p:tnLst>
+      <p:par>
+        <p:cTn id="1" dur="indefinite" restart="never" nodeType="tmRoot"/>
+      </p:par>
+    </p:tnLst>
+  </p:timing>
 </p:sld>
 </file>
 
@@ -4025,24 +4346,25 @@
           <a:p>
             <a:r>
               <a:rPr lang="en-US" dirty="0" smtClean="0"/>
-              <a:t>Virtual </a:t>
-            </a:r>
+              <a:t>Elderly / Disabled Assistance</a:t>
+            </a:r>
+          </a:p>
+          <a:p>
+            <a:endParaRPr lang="en-US" dirty="0" smtClean="0"/>
+          </a:p>
+          <a:p>
             <a:r>
               <a:rPr lang="en-US" dirty="0" smtClean="0"/>
-              <a:t>world state could be entirely simulated as in the prototype case, or the virtual world could be used to collaborate sensor information from external sources</a:t>
-            </a:r>
+              <a:t>Search and Rescue</a:t>
+            </a:r>
+          </a:p>
+          <a:p>
+            <a:endParaRPr lang="en-US" dirty="0" smtClean="0"/>
+          </a:p>
+          <a:p>
             <a:r>
               <a:rPr lang="en-US" dirty="0" smtClean="0"/>
-              <a:t>.</a:t>
-            </a:r>
-          </a:p>
-          <a:p>
-            <a:endParaRPr lang="en-US" dirty="0" smtClean="0"/>
-          </a:p>
-          <a:p>
-            <a:r>
-              <a:rPr lang="en-US" dirty="0" smtClean="0"/>
-              <a:t>In our implementation, robots remain idle when not paired and do not receive virtual world state. Robots could operate autonomously while making use of virtual world data when not actively paired to a human operator.</a:t>
+              <a:t>Security and Surveillance</a:t>
             </a:r>
             <a:endParaRPr lang="en-US" dirty="0"/>
           </a:p>
@@ -4056,6 +4378,13 @@
   <p:transition>
     <p:fade/>
   </p:transition>
+  <p:timing>
+    <p:tnLst>
+      <p:par>
+        <p:cTn id="1" dur="indefinite" restart="never" nodeType="tmRoot"/>
+      </p:par>
+    </p:tnLst>
+  </p:timing>
 </p:sld>
 </file>
 
@@ -4140,7 +4469,7 @@
           <a:p>
             <a:r>
               <a:rPr lang="en-US" dirty="0" smtClean="0"/>
-              <a:t>Elderly / Disabled Assistance</a:t>
+              <a:t>Virtual world state could be entirely simulated as in the prototype case, or the virtual world could be used to collaborate sensor information from external sources.</a:t>
             </a:r>
           </a:p>
           <a:p>
@@ -4149,16 +4478,7 @@
           <a:p>
             <a:r>
               <a:rPr lang="en-US" dirty="0" smtClean="0"/>
-              <a:t>Search and Rescue</a:t>
-            </a:r>
-          </a:p>
-          <a:p>
-            <a:endParaRPr lang="en-US" dirty="0" smtClean="0"/>
-          </a:p>
-          <a:p>
-            <a:r>
-              <a:rPr lang="en-US" dirty="0" smtClean="0"/>
-              <a:t>Security and Surveillance</a:t>
+              <a:t>In our implementation, robots remain idle when not paired and do not receive virtual world state. Robots could operate autonomously while making use of virtual world data when not actively paired to a human operator.</a:t>
             </a:r>
             <a:endParaRPr lang="en-US" dirty="0"/>
           </a:p>
@@ -4172,6 +4492,13 @@
   <p:transition>
     <p:fade/>
   </p:transition>
+  <p:timing>
+    <p:tnLst>
+      <p:par>
+        <p:cTn id="1" dur="indefinite" restart="never" nodeType="tmRoot"/>
+      </p:par>
+    </p:tnLst>
+  </p:timing>
 </p:sld>
 </file>
 
@@ -4272,18 +4599,44 @@
             </a:r>
             <a:r>
               <a:rPr lang="en-US" dirty="0" smtClean="0"/>
-              <a:t> virtual world could be used to collaborate with other sensors and appliances in a home environment</a:t>
+              <a:t> virtual world could be used to collaborate with other sensors and appliances in a home environment. For example, stored information might </a:t>
             </a:r>
             <a:r>
               <a:rPr lang="en-US" dirty="0" smtClean="0"/>
-              <a:t>. For example, stored information might include appliance settings, thermostat settings, the status of lights in various rooms, grocery stocks… etc.</a:t>
-            </a:r>
+              <a:t>include </a:t>
+            </a:r>
+            <a:r>
+              <a:rPr lang="en-US" dirty="0" smtClean="0"/>
+              <a:t>grocery </a:t>
+            </a:r>
+            <a:r>
+              <a:rPr lang="en-US" dirty="0" smtClean="0"/>
+              <a:t>stocks, locations of various items… </a:t>
+            </a:r>
+            <a:r>
+              <a:rPr lang="en-US" dirty="0" smtClean="0"/>
+              <a:t>etc</a:t>
+            </a:r>
+            <a:r>
+              <a:rPr lang="en-US" dirty="0" smtClean="0"/>
+              <a:t>.</a:t>
+            </a:r>
+          </a:p>
+          <a:p>
             <a:endParaRPr lang="en-US" dirty="0"/>
           </a:p>
           <a:p>
             <a:r>
               <a:rPr lang="en-US" dirty="0" smtClean="0"/>
-              <a:t>A remotely controlled robotic drone could be used by the elderly or disabled to perform simple tasks around the home such as fetching items or interacting with appliances.</a:t>
+              <a:t>A remotely controlled robotic drone could be used by the elderly or disabled to perform simple tasks around the home such as fetching items or </a:t>
+            </a:r>
+            <a:r>
+              <a:rPr lang="en-US" dirty="0" smtClean="0"/>
+              <a:t>mapping potential hazards in the area</a:t>
+            </a:r>
+            <a:r>
+              <a:rPr lang="en-US" dirty="0" smtClean="0"/>
+              <a:t>.</a:t>
             </a:r>
             <a:endParaRPr lang="en-US" dirty="0"/>
           </a:p>
@@ -4297,6 +4650,13 @@
   <p:transition>
     <p:fade/>
   </p:transition>
+  <p:timing>
+    <p:tnLst>
+      <p:par>
+        <p:cTn id="1" dur="indefinite" restart="never" nodeType="tmRoot"/>
+      </p:par>
+    </p:tnLst>
+  </p:timing>
 </p:sld>
 </file>
 
@@ -4393,32 +4753,16 @@
           <a:p>
             <a:r>
               <a:rPr lang="en-US" dirty="0" smtClean="0"/>
-              <a:t>Robotic drones are a means of performing search and rescue operations in areas which may be hazardous or inaccessible to human personnel</a:t>
-            </a:r>
+              <a:t>Robotic drones are a means of performing search and rescue operations in areas which may be hazardous or inaccessible to human personnel.</a:t>
+            </a:r>
+          </a:p>
+          <a:p>
+            <a:endParaRPr lang="en-US" dirty="0"/>
+          </a:p>
+          <a:p>
             <a:r>
               <a:rPr lang="en-US" dirty="0" smtClean="0"/>
-              <a:t>.</a:t>
-            </a:r>
-          </a:p>
-          <a:p>
-            <a:endParaRPr lang="en-US" dirty="0"/>
-          </a:p>
-          <a:p>
-            <a:r>
-              <a:rPr lang="en-US" dirty="0" smtClean="0"/>
-              <a:t>A virtual world could be used to collaborate sensor information </a:t>
-            </a:r>
-            <a:r>
-              <a:rPr lang="en-US" dirty="0" smtClean="0"/>
-              <a:t>as </a:t>
-            </a:r>
-            <a:r>
-              <a:rPr lang="en-US" dirty="0" smtClean="0"/>
-              <a:t>well as to coordinate the movements of the drones themselves</a:t>
-            </a:r>
-            <a:r>
-              <a:rPr lang="en-US" dirty="0" smtClean="0"/>
-              <a:t>.</a:t>
+              <a:t>A virtual world could be used to collaborate sensor information as well as to coordinate the movements of the drones themselves.</a:t>
             </a:r>
           </a:p>
           <a:p>
@@ -4441,6 +4785,13 @@
   <p:transition>
     <p:fade/>
   </p:transition>
+  <p:timing>
+    <p:tnLst>
+      <p:par>
+        <p:cTn id="1" dur="indefinite" restart="never" nodeType="tmRoot"/>
+      </p:par>
+    </p:tnLst>
+  </p:timing>
 </p:sld>
 </file>
 
@@ -4546,11 +4897,15 @@
           <a:p>
             <a:r>
               <a:rPr lang="en-US" dirty="0" smtClean="0"/>
-              <a:t>A </a:t>
+              <a:t>A mobile client ensures that security personnel can operate the drones regardless of their current position when an alarm is </a:t>
             </a:r>
             <a:r>
               <a:rPr lang="en-US" dirty="0" smtClean="0"/>
-              <a:t>mobile client ensures that security personnel can operate the drones regardless of their current position when an alarm is triggered.</a:t>
+              <a:t>triggered (greatly decreased the response time to </a:t>
+            </a:r>
+            <a:r>
+              <a:rPr lang="en-US" smtClean="0"/>
+              <a:t>an emergency).</a:t>
             </a:r>
             <a:endParaRPr lang="en-US" dirty="0"/>
           </a:p>
@@ -5204,6 +5559,13 @@
   <p:transition>
     <p:fade/>
   </p:transition>
+  <p:timing>
+    <p:tnLst>
+      <p:par>
+        <p:cTn id="1" dur="indefinite" restart="never" nodeType="tmRoot"/>
+      </p:par>
+    </p:tnLst>
+  </p:timing>
 </p:sld>
 </file>
 
@@ -5397,6 +5759,13 @@
   <p:transition>
     <p:fade/>
   </p:transition>
+  <p:timing>
+    <p:tnLst>
+      <p:par>
+        <p:cTn id="1" dur="indefinite" restart="never" nodeType="tmRoot"/>
+      </p:par>
+    </p:tnLst>
+  </p:timing>
 </p:sld>
 </file>
 
@@ -5588,14 +5957,6 @@
               </a:rPr>
               <a:t>. </a:t>
             </a:r>
-            <a:endParaRPr lang="en-CA" dirty="0" smtClean="0">
-              <a:solidFill>
-                <a:schemeClr val="tx1"/>
-              </a:solidFill>
-              <a:latin typeface="+mn-lt"/>
-              <a:ea typeface="+mn-ea"/>
-              <a:cs typeface="+mn-cs"/>
-            </a:endParaRPr>
           </a:p>
         </p:txBody>
       </p:sp>
@@ -5607,6 +5968,13 @@
   <p:transition>
     <p:fade/>
   </p:transition>
+  <p:timing>
+    <p:tnLst>
+      <p:par>
+        <p:cTn id="1" dur="indefinite" restart="never" nodeType="tmRoot"/>
+      </p:par>
+    </p:tnLst>
+  </p:timing>
 </p:sld>
 </file>
 
@@ -5668,11 +6036,7 @@
           <a:p>
             <a:r>
               <a:rPr lang="en-US" dirty="0" smtClean="0"/>
-              <a:t>Solution - System </a:t>
-            </a:r>
-            <a:r>
-              <a:rPr lang="en-US" dirty="0" smtClean="0"/>
-              <a:t>Architecture</a:t>
+              <a:t>Solution - System Architecture</a:t>
             </a:r>
             <a:endParaRPr lang="en-US" dirty="0"/>
           </a:p>
@@ -5687,7 +6051,7 @@
           <p:nvPr/>
         </p:nvPicPr>
         <p:blipFill>
-          <a:blip r:embed="rId2" cstate="print"/>
+          <a:blip r:embed="rId3" cstate="print"/>
           <a:stretch>
             <a:fillRect/>
           </a:stretch>
@@ -5710,6 +6074,13 @@
   <p:transition>
     <p:fade/>
   </p:transition>
+  <p:timing>
+    <p:tnLst>
+      <p:par>
+        <p:cTn id="1" dur="indefinite" restart="never" nodeType="tmRoot"/>
+      </p:par>
+    </p:tnLst>
+  </p:timing>
 </p:sld>
 </file>
 
@@ -6173,6 +6544,13 @@
   <p:transition>
     <p:fade/>
   </p:transition>
+  <p:timing>
+    <p:tnLst>
+      <p:par>
+        <p:cTn id="1" dur="indefinite" restart="never" nodeType="tmRoot"/>
+      </p:par>
+    </p:tnLst>
+  </p:timing>
 </p:sld>
 </file>
 
@@ -6442,6 +6820,13 @@
   <p:transition>
     <p:fade/>
   </p:transition>
+  <p:timing>
+    <p:tnLst>
+      <p:par>
+        <p:cTn id="1" dur="indefinite" restart="never" nodeType="tmRoot"/>
+      </p:par>
+    </p:tnLst>
+  </p:timing>
 </p:sld>
 </file>
 
@@ -6764,6 +7149,13 @@
   <p:transition>
     <p:fade/>
   </p:transition>
+  <p:timing>
+    <p:tnLst>
+      <p:par>
+        <p:cTn id="1" dur="indefinite" restart="never" nodeType="tmRoot"/>
+      </p:par>
+    </p:tnLst>
+  </p:timing>
 </p:sld>
 </file>
 
@@ -7024,6 +7416,13 @@
   <p:transition>
     <p:fade/>
   </p:transition>
+  <p:timing>
+    <p:tnLst>
+      <p:par>
+        <p:cTn id="1" dur="indefinite" restart="never" nodeType="tmRoot"/>
+      </p:par>
+    </p:tnLst>
+  </p:timing>
 </p:sld>
 </file>
 

</xml_diff>